<commit_message>
Decision for template and one of the lean slide decks
</commit_message>
<xml_diff>
--- a/Slides/src/agile-dev-processes-nnn-lean.pptx
+++ b/Slides/src/agile-dev-processes-nnn-lean.pptx
@@ -4,33 +4,34 @@
   <p:sldMasterIdLst>
     <p:sldMasterId id="2147483660" r:id="rId1"/>
     <p:sldMasterId id="2147483672" r:id="rId2"/>
+    <p:sldMasterId id="2147483683" r:id="rId3"/>
   </p:sldMasterIdLst>
   <p:notesMasterIdLst>
-    <p:notesMasterId r:id="rId25"/>
+    <p:notesMasterId r:id="rId26"/>
   </p:notesMasterIdLst>
   <p:sldIdLst>
-    <p:sldId id="256" r:id="rId3"/>
-    <p:sldId id="310" r:id="rId4"/>
-    <p:sldId id="311" r:id="rId5"/>
-    <p:sldId id="312" r:id="rId6"/>
-    <p:sldId id="313" r:id="rId7"/>
-    <p:sldId id="314" r:id="rId8"/>
-    <p:sldId id="315" r:id="rId9"/>
-    <p:sldId id="316" r:id="rId10"/>
-    <p:sldId id="317" r:id="rId11"/>
-    <p:sldId id="318" r:id="rId12"/>
-    <p:sldId id="319" r:id="rId13"/>
-    <p:sldId id="320" r:id="rId14"/>
-    <p:sldId id="321" r:id="rId15"/>
-    <p:sldId id="322" r:id="rId16"/>
-    <p:sldId id="323" r:id="rId17"/>
-    <p:sldId id="324" r:id="rId18"/>
-    <p:sldId id="325" r:id="rId19"/>
-    <p:sldId id="326" r:id="rId20"/>
-    <p:sldId id="327" r:id="rId21"/>
-    <p:sldId id="328" r:id="rId22"/>
-    <p:sldId id="329" r:id="rId23"/>
-    <p:sldId id="330" r:id="rId24"/>
+    <p:sldId id="256" r:id="rId4"/>
+    <p:sldId id="310" r:id="rId5"/>
+    <p:sldId id="311" r:id="rId6"/>
+    <p:sldId id="312" r:id="rId7"/>
+    <p:sldId id="313" r:id="rId8"/>
+    <p:sldId id="314" r:id="rId9"/>
+    <p:sldId id="315" r:id="rId10"/>
+    <p:sldId id="316" r:id="rId11"/>
+    <p:sldId id="317" r:id="rId12"/>
+    <p:sldId id="318" r:id="rId13"/>
+    <p:sldId id="319" r:id="rId14"/>
+    <p:sldId id="320" r:id="rId15"/>
+    <p:sldId id="321" r:id="rId16"/>
+    <p:sldId id="322" r:id="rId17"/>
+    <p:sldId id="323" r:id="rId18"/>
+    <p:sldId id="324" r:id="rId19"/>
+    <p:sldId id="325" r:id="rId20"/>
+    <p:sldId id="326" r:id="rId21"/>
+    <p:sldId id="327" r:id="rId22"/>
+    <p:sldId id="328" r:id="rId23"/>
+    <p:sldId id="329" r:id="rId24"/>
+    <p:sldId id="330" r:id="rId25"/>
   </p:sldIdLst>
   <p:sldSz cx="9144000" cy="6858000" type="screen4x3"/>
   <p:notesSz cx="6858000" cy="9144000"/>
@@ -214,7 +215,7 @@
           <a:p>
             <a:fld id="{E4EF4512-9F98-E34D-B864-4227A9345C4D}" type="datetimeFigureOut">
               <a:rPr lang="en-US" smtClean="0"/>
-              <a:t>4/3/14</a:t>
+              <a:t>17/04/14</a:t>
             </a:fld>
             <a:endParaRPr lang="en-US"/>
           </a:p>
@@ -663,7 +664,7 @@
           <a:p>
             <a:fld id="{DE9D31E7-7064-EF4F-93F0-966D653C7150}" type="datetimeFigureOut">
               <a:rPr lang="en-US" smtClean="0"/>
-              <a:t>4/2/14</a:t>
+              <a:t>17/04/14</a:t>
             </a:fld>
             <a:endParaRPr lang="en-US"/>
           </a:p>
@@ -833,7 +834,7 @@
           <a:p>
             <a:fld id="{DE9D31E7-7064-EF4F-93F0-966D653C7150}" type="datetimeFigureOut">
               <a:rPr lang="en-US" smtClean="0"/>
-              <a:t>4/2/14</a:t>
+              <a:t>17/04/14</a:t>
             </a:fld>
             <a:endParaRPr lang="en-US"/>
           </a:p>
@@ -1013,7 +1014,7 @@
           <a:p>
             <a:fld id="{DE9D31E7-7064-EF4F-93F0-966D653C7150}" type="datetimeFigureOut">
               <a:rPr lang="en-US" smtClean="0"/>
-              <a:t>4/2/14</a:t>
+              <a:t>17/04/14</a:t>
             </a:fld>
             <a:endParaRPr lang="en-US"/>
           </a:p>
@@ -1275,7 +1276,7 @@
                 </a:solidFill>
               </a:rPr>
               <a:pPr/>
-              <a:t>4/3/14</a:t>
+              <a:t>17/04/14</a:t>
             </a:fld>
             <a:endParaRPr lang="en-US" dirty="0">
               <a:solidFill>
@@ -1515,7 +1516,7 @@
                 </a:solidFill>
               </a:rPr>
               <a:pPr/>
-              <a:t>4/3/14</a:t>
+              <a:t>17/04/14</a:t>
             </a:fld>
             <a:endParaRPr lang="en-US">
               <a:solidFill>
@@ -1849,7 +1850,7 @@
                 </a:solidFill>
               </a:rPr>
               <a:pPr/>
-              <a:t>4/3/14</a:t>
+              <a:t>17/04/14</a:t>
             </a:fld>
             <a:endParaRPr lang="en-US">
               <a:solidFill>
@@ -2006,7 +2007,7 @@
                 </a:solidFill>
               </a:rPr>
               <a:pPr/>
-              <a:t>4/3/14</a:t>
+              <a:t>17/04/14</a:t>
             </a:fld>
             <a:endParaRPr lang="en-US">
               <a:solidFill>
@@ -2140,7 +2141,7 @@
                 </a:solidFill>
               </a:rPr>
               <a:pPr/>
-              <a:t>4/3/14</a:t>
+              <a:t>17/04/14</a:t>
             </a:fld>
             <a:endParaRPr lang="en-US">
               <a:solidFill>
@@ -2458,7 +2459,7 @@
                 </a:solidFill>
               </a:rPr>
               <a:pPr/>
-              <a:t>4/3/14</a:t>
+              <a:t>17/04/14</a:t>
             </a:fld>
             <a:endParaRPr lang="en-US">
               <a:solidFill>
@@ -2754,7 +2755,7 @@
                 </a:solidFill>
               </a:rPr>
               <a:pPr/>
-              <a:t>4/3/14</a:t>
+              <a:t>17/04/14</a:t>
             </a:fld>
             <a:endParaRPr lang="en-US">
               <a:solidFill>
@@ -2963,7 +2964,7 @@
                 </a:solidFill>
               </a:rPr>
               <a:pPr/>
-              <a:t>4/3/14</a:t>
+              <a:t>17/04/14</a:t>
             </a:fld>
             <a:endParaRPr lang="en-US">
               <a:solidFill>
@@ -3165,7 +3166,7 @@
           <a:p>
             <a:fld id="{DE9D31E7-7064-EF4F-93F0-966D653C7150}" type="datetimeFigureOut">
               <a:rPr lang="en-US" smtClean="0"/>
-              <a:t>4/2/14</a:t>
+              <a:t>17/04/14</a:t>
             </a:fld>
             <a:endParaRPr lang="en-US"/>
           </a:p>
@@ -3352,7 +3353,7 @@
                 </a:solidFill>
               </a:rPr>
               <a:pPr/>
-              <a:t>4/3/14</a:t>
+              <a:t>17/04/14</a:t>
             </a:fld>
             <a:endParaRPr lang="en-US">
               <a:solidFill>
@@ -3722,6 +3723,806 @@
   <p:clrMapOvr>
     <a:masterClrMapping/>
   </p:clrMapOvr>
+</p:sldLayout>
+</file>
+
+<file path=ppt/slideLayouts/slideLayout22.xml><?xml version="1.0" encoding="utf-8"?>
+<p:sldLayout xmlns:a="http://schemas.openxmlformats.org/drawingml/2006/main" xmlns:r="http://schemas.openxmlformats.org/officeDocument/2006/relationships" xmlns:p="http://schemas.openxmlformats.org/presentationml/2006/main" type="obj" preserve="1">
+  <p:cSld name="Rubrik och innehåll">
+    <p:spTree>
+      <p:nvGrpSpPr>
+        <p:cNvPr id="1" name=""/>
+        <p:cNvGrpSpPr/>
+        <p:nvPr/>
+      </p:nvGrpSpPr>
+      <p:grpSpPr>
+        <a:xfrm>
+          <a:off x="0" y="0"/>
+          <a:ext cx="0" cy="0"/>
+          <a:chOff x="0" y="0"/>
+          <a:chExt cx="0" cy="0"/>
+        </a:xfrm>
+      </p:grpSpPr>
+      <p:sp>
+        <p:nvSpPr>
+          <p:cNvPr id="2" name="Rubrik 1"/>
+          <p:cNvSpPr>
+            <a:spLocks noGrp="1"/>
+          </p:cNvSpPr>
+          <p:nvPr>
+            <p:ph type="title"/>
+          </p:nvPr>
+        </p:nvSpPr>
+        <p:spPr/>
+        <p:txBody>
+          <a:bodyPr/>
+          <a:lstStyle/>
+          <a:p>
+            <a:r>
+              <a:rPr lang="en-US" smtClean="0"/>
+              <a:t>Click to edit Master title style</a:t>
+            </a:r>
+            <a:endParaRPr lang="sv-SE"/>
+          </a:p>
+        </p:txBody>
+      </p:sp>
+      <p:sp>
+        <p:nvSpPr>
+          <p:cNvPr id="3" name="Platshållare för innehåll 2"/>
+          <p:cNvSpPr>
+            <a:spLocks noGrp="1"/>
+          </p:cNvSpPr>
+          <p:nvPr>
+            <p:ph idx="1"/>
+          </p:nvPr>
+        </p:nvSpPr>
+        <p:spPr/>
+        <p:txBody>
+          <a:bodyPr/>
+          <a:lstStyle/>
+          <a:p>
+            <a:pPr lvl="0"/>
+            <a:r>
+              <a:rPr lang="en-US" smtClean="0"/>
+              <a:t>Click to edit Master text styles</a:t>
+            </a:r>
+          </a:p>
+          <a:p>
+            <a:pPr lvl="1"/>
+            <a:r>
+              <a:rPr lang="en-US" smtClean="0"/>
+              <a:t>Second level</a:t>
+            </a:r>
+          </a:p>
+          <a:p>
+            <a:pPr lvl="2"/>
+            <a:r>
+              <a:rPr lang="en-US" smtClean="0"/>
+              <a:t>Third level</a:t>
+            </a:r>
+          </a:p>
+          <a:p>
+            <a:pPr lvl="3"/>
+            <a:r>
+              <a:rPr lang="en-US" smtClean="0"/>
+              <a:t>Fourth level</a:t>
+            </a:r>
+          </a:p>
+          <a:p>
+            <a:pPr lvl="4"/>
+            <a:r>
+              <a:rPr lang="en-US" smtClean="0"/>
+              <a:t>Fifth level</a:t>
+            </a:r>
+            <a:endParaRPr lang="sv-SE"/>
+          </a:p>
+        </p:txBody>
+      </p:sp>
+    </p:spTree>
+    <p:extLst>
+      <p:ext uri="{BB962C8B-B14F-4D97-AF65-F5344CB8AC3E}">
+        <p14:creationId xmlns:p14="http://schemas.microsoft.com/office/powerpoint/2010/main" val="3017918769"/>
+      </p:ext>
+    </p:extLst>
+  </p:cSld>
+  <p:clrMapOvr>
+    <a:masterClrMapping/>
+  </p:clrMapOvr>
+  <p:timing>
+    <p:tnLst>
+      <p:par>
+        <p:cTn xmlns:p14="http://schemas.microsoft.com/office/powerpoint/2010/main" id="1" dur="indefinite" restart="never" nodeType="tmRoot"/>
+      </p:par>
+    </p:tnLst>
+  </p:timing>
+</p:sldLayout>
+</file>
+
+<file path=ppt/slideLayouts/slideLayout23.xml><?xml version="1.0" encoding="utf-8"?>
+<p:sldLayout xmlns:a="http://schemas.openxmlformats.org/drawingml/2006/main" xmlns:r="http://schemas.openxmlformats.org/officeDocument/2006/relationships" xmlns:p="http://schemas.openxmlformats.org/presentationml/2006/main" type="title">
+  <p:cSld name="Titelfolie">
+    <p:spTree>
+      <p:nvGrpSpPr>
+        <p:cNvPr id="1" name=""/>
+        <p:cNvGrpSpPr/>
+        <p:nvPr/>
+      </p:nvGrpSpPr>
+      <p:grpSpPr>
+        <a:xfrm>
+          <a:off x="0" y="0"/>
+          <a:ext cx="0" cy="0"/>
+          <a:chOff x="0" y="0"/>
+          <a:chExt cx="0" cy="0"/>
+        </a:xfrm>
+      </p:grpSpPr>
+      <p:sp>
+        <p:nvSpPr>
+          <p:cNvPr id="2" name="Titel 1"/>
+          <p:cNvSpPr>
+            <a:spLocks noGrp="1"/>
+          </p:cNvSpPr>
+          <p:nvPr>
+            <p:ph type="ctrTitle"/>
+          </p:nvPr>
+        </p:nvSpPr>
+        <p:spPr>
+          <a:xfrm>
+            <a:off x="685800" y="2130425"/>
+            <a:ext cx="7772400" cy="1470025"/>
+          </a:xfrm>
+        </p:spPr>
+        <p:txBody>
+          <a:bodyPr/>
+          <a:lstStyle>
+            <a:lvl1pPr>
+              <a:defRPr>
+                <a:latin typeface="Georgia" pitchFamily="18" charset="0"/>
+              </a:defRPr>
+            </a:lvl1pPr>
+          </a:lstStyle>
+          <a:p>
+            <a:r>
+              <a:rPr lang="en-US" smtClean="0"/>
+              <a:t>Click to edit Master title style</a:t>
+            </a:r>
+            <a:endParaRPr lang="de-DE" dirty="0"/>
+          </a:p>
+        </p:txBody>
+      </p:sp>
+      <p:sp>
+        <p:nvSpPr>
+          <p:cNvPr id="3" name="Untertitel 2"/>
+          <p:cNvSpPr>
+            <a:spLocks noGrp="1"/>
+          </p:cNvSpPr>
+          <p:nvPr>
+            <p:ph type="subTitle" idx="1"/>
+          </p:nvPr>
+        </p:nvSpPr>
+        <p:spPr>
+          <a:xfrm>
+            <a:off x="1371600" y="3886200"/>
+            <a:ext cx="6400800" cy="1752600"/>
+          </a:xfrm>
+        </p:spPr>
+        <p:txBody>
+          <a:bodyPr/>
+          <a:lstStyle>
+            <a:lvl1pPr marL="0" indent="0" algn="ctr">
+              <a:buNone/>
+              <a:defRPr>
+                <a:solidFill>
+                  <a:schemeClr val="tx1">
+                    <a:tint val="75000"/>
+                  </a:schemeClr>
+                </a:solidFill>
+                <a:latin typeface="Georgia" pitchFamily="18" charset="0"/>
+              </a:defRPr>
+            </a:lvl1pPr>
+            <a:lvl2pPr marL="457200" indent="0" algn="ctr">
+              <a:buNone/>
+              <a:defRPr>
+                <a:solidFill>
+                  <a:schemeClr val="tx1">
+                    <a:tint val="75000"/>
+                  </a:schemeClr>
+                </a:solidFill>
+              </a:defRPr>
+            </a:lvl2pPr>
+            <a:lvl3pPr marL="914400" indent="0" algn="ctr">
+              <a:buNone/>
+              <a:defRPr>
+                <a:solidFill>
+                  <a:schemeClr val="tx1">
+                    <a:tint val="75000"/>
+                  </a:schemeClr>
+                </a:solidFill>
+              </a:defRPr>
+            </a:lvl3pPr>
+            <a:lvl4pPr marL="1371600" indent="0" algn="ctr">
+              <a:buNone/>
+              <a:defRPr>
+                <a:solidFill>
+                  <a:schemeClr val="tx1">
+                    <a:tint val="75000"/>
+                  </a:schemeClr>
+                </a:solidFill>
+              </a:defRPr>
+            </a:lvl4pPr>
+            <a:lvl5pPr marL="1828800" indent="0" algn="ctr">
+              <a:buNone/>
+              <a:defRPr>
+                <a:solidFill>
+                  <a:schemeClr val="tx1">
+                    <a:tint val="75000"/>
+                  </a:schemeClr>
+                </a:solidFill>
+              </a:defRPr>
+            </a:lvl5pPr>
+            <a:lvl6pPr marL="2286000" indent="0" algn="ctr">
+              <a:buNone/>
+              <a:defRPr>
+                <a:solidFill>
+                  <a:schemeClr val="tx1">
+                    <a:tint val="75000"/>
+                  </a:schemeClr>
+                </a:solidFill>
+              </a:defRPr>
+            </a:lvl6pPr>
+            <a:lvl7pPr marL="2743200" indent="0" algn="ctr">
+              <a:buNone/>
+              <a:defRPr>
+                <a:solidFill>
+                  <a:schemeClr val="tx1">
+                    <a:tint val="75000"/>
+                  </a:schemeClr>
+                </a:solidFill>
+              </a:defRPr>
+            </a:lvl7pPr>
+            <a:lvl8pPr marL="3200400" indent="0" algn="ctr">
+              <a:buNone/>
+              <a:defRPr>
+                <a:solidFill>
+                  <a:schemeClr val="tx1">
+                    <a:tint val="75000"/>
+                  </a:schemeClr>
+                </a:solidFill>
+              </a:defRPr>
+            </a:lvl8pPr>
+            <a:lvl9pPr marL="3657600" indent="0" algn="ctr">
+              <a:buNone/>
+              <a:defRPr>
+                <a:solidFill>
+                  <a:schemeClr val="tx1">
+                    <a:tint val="75000"/>
+                  </a:schemeClr>
+                </a:solidFill>
+              </a:defRPr>
+            </a:lvl9pPr>
+          </a:lstStyle>
+          <a:p>
+            <a:r>
+              <a:rPr lang="en-US" smtClean="0"/>
+              <a:t>Click to edit Master subtitle style</a:t>
+            </a:r>
+            <a:endParaRPr lang="de-DE" dirty="0"/>
+          </a:p>
+        </p:txBody>
+      </p:sp>
+      <p:sp>
+        <p:nvSpPr>
+          <p:cNvPr id="4" name="Datumsplatzhalter 3"/>
+          <p:cNvSpPr>
+            <a:spLocks noGrp="1"/>
+          </p:cNvSpPr>
+          <p:nvPr>
+            <p:ph type="dt" sz="half" idx="10"/>
+          </p:nvPr>
+        </p:nvSpPr>
+        <p:spPr>
+          <a:xfrm>
+            <a:off x="4238247" y="6434242"/>
+            <a:ext cx="1008112" cy="365125"/>
+          </a:xfrm>
+          <a:prstGeom prst="rect">
+            <a:avLst/>
+          </a:prstGeom>
+        </p:spPr>
+        <p:txBody>
+          <a:bodyPr/>
+          <a:lstStyle>
+            <a:lvl1pPr>
+              <a:defRPr>
+                <a:latin typeface="Georgia" pitchFamily="18" charset="0"/>
+              </a:defRPr>
+            </a:lvl1pPr>
+          </a:lstStyle>
+          <a:p>
+            <a:fld id="{C699CB88-5E1A-4FAC-892A-60949ACB1F6F}" type="datetimeFigureOut">
+              <a:rPr lang="en-US" smtClean="0">
+                <a:solidFill>
+                  <a:prstClr val="black">
+                    <a:tint val="75000"/>
+                  </a:prstClr>
+                </a:solidFill>
+              </a:rPr>
+              <a:pPr/>
+              <a:t>17/04/14</a:t>
+            </a:fld>
+            <a:endParaRPr lang="en-US" dirty="0">
+              <a:solidFill>
+                <a:prstClr val="black">
+                  <a:tint val="75000"/>
+                </a:prstClr>
+              </a:solidFill>
+            </a:endParaRPr>
+          </a:p>
+        </p:txBody>
+      </p:sp>
+      <p:sp>
+        <p:nvSpPr>
+          <p:cNvPr id="5" name="Fußzeilenplatzhalter 4"/>
+          <p:cNvSpPr>
+            <a:spLocks noGrp="1"/>
+          </p:cNvSpPr>
+          <p:nvPr>
+            <p:ph type="ftr" sz="quarter" idx="11"/>
+          </p:nvPr>
+        </p:nvSpPr>
+        <p:spPr>
+          <a:xfrm>
+            <a:off x="5318367" y="6434242"/>
+            <a:ext cx="2895600" cy="365125"/>
+          </a:xfrm>
+          <a:prstGeom prst="rect">
+            <a:avLst/>
+          </a:prstGeom>
+        </p:spPr>
+        <p:txBody>
+          <a:bodyPr/>
+          <a:lstStyle>
+            <a:lvl1pPr>
+              <a:defRPr>
+                <a:latin typeface="Georgia" pitchFamily="18" charset="0"/>
+              </a:defRPr>
+            </a:lvl1pPr>
+          </a:lstStyle>
+          <a:p>
+            <a:endParaRPr lang="en-US">
+              <a:solidFill>
+                <a:prstClr val="black">
+                  <a:tint val="75000"/>
+                </a:prstClr>
+              </a:solidFill>
+            </a:endParaRPr>
+          </a:p>
+        </p:txBody>
+      </p:sp>
+      <p:sp>
+        <p:nvSpPr>
+          <p:cNvPr id="6" name="Foliennummernplatzhalter 5"/>
+          <p:cNvSpPr>
+            <a:spLocks noGrp="1"/>
+          </p:cNvSpPr>
+          <p:nvPr>
+            <p:ph type="sldNum" sz="quarter" idx="12"/>
+          </p:nvPr>
+        </p:nvSpPr>
+        <p:spPr>
+          <a:xfrm>
+            <a:off x="8291903" y="6433808"/>
+            <a:ext cx="842170" cy="365125"/>
+          </a:xfrm>
+          <a:prstGeom prst="rect">
+            <a:avLst/>
+          </a:prstGeom>
+        </p:spPr>
+        <p:txBody>
+          <a:bodyPr/>
+          <a:lstStyle>
+            <a:lvl1pPr>
+              <a:defRPr>
+                <a:latin typeface="Georgia" pitchFamily="18" charset="0"/>
+              </a:defRPr>
+            </a:lvl1pPr>
+          </a:lstStyle>
+          <a:p>
+            <a:fld id="{91974DF9-AD47-4691-BA21-BBFCE3637A9A}" type="slidenum">
+              <a:rPr lang="en-US" smtClean="0">
+                <a:solidFill>
+                  <a:prstClr val="black">
+                    <a:tint val="75000"/>
+                  </a:prstClr>
+                </a:solidFill>
+              </a:rPr>
+              <a:pPr/>
+              <a:t>‹#›</a:t>
+            </a:fld>
+            <a:endParaRPr lang="en-US">
+              <a:solidFill>
+                <a:prstClr val="black">
+                  <a:tint val="75000"/>
+                </a:prstClr>
+              </a:solidFill>
+            </a:endParaRPr>
+          </a:p>
+        </p:txBody>
+      </p:sp>
+    </p:spTree>
+    <p:extLst>
+      <p:ext uri="{BB962C8B-B14F-4D97-AF65-F5344CB8AC3E}">
+        <p14:creationId xmlns:p14="http://schemas.microsoft.com/office/powerpoint/2010/main" val="3515320696"/>
+      </p:ext>
+    </p:extLst>
+  </p:cSld>
+  <p:clrMapOvr>
+    <a:masterClrMapping/>
+  </p:clrMapOvr>
+  <p:transition xmlns:p14="http://schemas.microsoft.com/office/powerpoint/2010/main">
+    <p:fade/>
+  </p:transition>
+  <p:timing>
+    <p:tnLst>
+      <p:par>
+        <p:cTn xmlns:p14="http://schemas.microsoft.com/office/powerpoint/2010/main" id="1" dur="indefinite" restart="never" nodeType="tmRoot"/>
+      </p:par>
+    </p:tnLst>
+  </p:timing>
+</p:sldLayout>
+</file>
+
+<file path=ppt/slideLayouts/slideLayout24.xml><?xml version="1.0" encoding="utf-8"?>
+<p:sldLayout xmlns:a="http://schemas.openxmlformats.org/drawingml/2006/main" xmlns:r="http://schemas.openxmlformats.org/officeDocument/2006/relationships" xmlns:p="http://schemas.openxmlformats.org/presentationml/2006/main" type="twoObj">
+  <p:cSld name="Zwei Inhalte">
+    <p:spTree>
+      <p:nvGrpSpPr>
+        <p:cNvPr id="1" name=""/>
+        <p:cNvGrpSpPr/>
+        <p:nvPr/>
+      </p:nvGrpSpPr>
+      <p:grpSpPr>
+        <a:xfrm>
+          <a:off x="0" y="0"/>
+          <a:ext cx="0" cy="0"/>
+          <a:chOff x="0" y="0"/>
+          <a:chExt cx="0" cy="0"/>
+        </a:xfrm>
+      </p:grpSpPr>
+      <p:sp>
+        <p:nvSpPr>
+          <p:cNvPr id="2" name="Titel 1"/>
+          <p:cNvSpPr>
+            <a:spLocks noGrp="1"/>
+          </p:cNvSpPr>
+          <p:nvPr>
+            <p:ph type="title"/>
+          </p:nvPr>
+        </p:nvSpPr>
+        <p:spPr/>
+        <p:txBody>
+          <a:bodyPr/>
+          <a:lstStyle/>
+          <a:p>
+            <a:r>
+              <a:rPr lang="en-US" smtClean="0"/>
+              <a:t>Click to edit Master title style</a:t>
+            </a:r>
+            <a:endParaRPr lang="de-DE"/>
+          </a:p>
+        </p:txBody>
+      </p:sp>
+      <p:sp>
+        <p:nvSpPr>
+          <p:cNvPr id="3" name="Inhaltsplatzhalter 2"/>
+          <p:cNvSpPr>
+            <a:spLocks noGrp="1"/>
+          </p:cNvSpPr>
+          <p:nvPr>
+            <p:ph sz="half" idx="1"/>
+          </p:nvPr>
+        </p:nvSpPr>
+        <p:spPr>
+          <a:xfrm>
+            <a:off x="457200" y="1600200"/>
+            <a:ext cx="4038600" cy="4525963"/>
+          </a:xfrm>
+        </p:spPr>
+        <p:txBody>
+          <a:bodyPr>
+            <a:normAutofit/>
+          </a:bodyPr>
+          <a:lstStyle>
+            <a:lvl1pPr>
+              <a:defRPr sz="2400"/>
+            </a:lvl1pPr>
+            <a:lvl2pPr>
+              <a:defRPr sz="2000"/>
+            </a:lvl2pPr>
+            <a:lvl3pPr>
+              <a:defRPr sz="1800"/>
+            </a:lvl3pPr>
+            <a:lvl4pPr>
+              <a:defRPr sz="1600"/>
+            </a:lvl4pPr>
+            <a:lvl5pPr>
+              <a:defRPr sz="1600"/>
+            </a:lvl5pPr>
+            <a:lvl6pPr>
+              <a:defRPr sz="1800"/>
+            </a:lvl6pPr>
+            <a:lvl7pPr>
+              <a:defRPr sz="1800"/>
+            </a:lvl7pPr>
+            <a:lvl8pPr>
+              <a:defRPr sz="1800"/>
+            </a:lvl8pPr>
+            <a:lvl9pPr>
+              <a:defRPr sz="1800"/>
+            </a:lvl9pPr>
+          </a:lstStyle>
+          <a:p>
+            <a:pPr lvl="0"/>
+            <a:r>
+              <a:rPr lang="en-US" smtClean="0"/>
+              <a:t>Click to edit Master text styles</a:t>
+            </a:r>
+          </a:p>
+          <a:p>
+            <a:pPr lvl="1"/>
+            <a:r>
+              <a:rPr lang="en-US" smtClean="0"/>
+              <a:t>Second level</a:t>
+            </a:r>
+          </a:p>
+          <a:p>
+            <a:pPr lvl="2"/>
+            <a:r>
+              <a:rPr lang="en-US" smtClean="0"/>
+              <a:t>Third level</a:t>
+            </a:r>
+          </a:p>
+          <a:p>
+            <a:pPr lvl="3"/>
+            <a:r>
+              <a:rPr lang="en-US" smtClean="0"/>
+              <a:t>Fourth level</a:t>
+            </a:r>
+          </a:p>
+          <a:p>
+            <a:pPr lvl="4"/>
+            <a:r>
+              <a:rPr lang="en-US" smtClean="0"/>
+              <a:t>Fifth level</a:t>
+            </a:r>
+            <a:endParaRPr lang="de-DE" dirty="0"/>
+          </a:p>
+        </p:txBody>
+      </p:sp>
+      <p:sp>
+        <p:nvSpPr>
+          <p:cNvPr id="4" name="Inhaltsplatzhalter 3"/>
+          <p:cNvSpPr>
+            <a:spLocks noGrp="1"/>
+          </p:cNvSpPr>
+          <p:nvPr>
+            <p:ph sz="half" idx="2"/>
+          </p:nvPr>
+        </p:nvSpPr>
+        <p:spPr>
+          <a:xfrm>
+            <a:off x="4648200" y="1600200"/>
+            <a:ext cx="4038600" cy="4525963"/>
+          </a:xfrm>
+        </p:spPr>
+        <p:txBody>
+          <a:bodyPr>
+            <a:normAutofit/>
+          </a:bodyPr>
+          <a:lstStyle>
+            <a:lvl1pPr>
+              <a:defRPr sz="2400"/>
+            </a:lvl1pPr>
+            <a:lvl2pPr>
+              <a:defRPr sz="2000"/>
+            </a:lvl2pPr>
+            <a:lvl3pPr>
+              <a:defRPr sz="1800"/>
+            </a:lvl3pPr>
+            <a:lvl4pPr>
+              <a:defRPr sz="1600"/>
+            </a:lvl4pPr>
+            <a:lvl5pPr>
+              <a:defRPr sz="1600"/>
+            </a:lvl5pPr>
+            <a:lvl6pPr>
+              <a:defRPr sz="1800"/>
+            </a:lvl6pPr>
+            <a:lvl7pPr>
+              <a:defRPr sz="1800"/>
+            </a:lvl7pPr>
+            <a:lvl8pPr>
+              <a:defRPr sz="1800"/>
+            </a:lvl8pPr>
+            <a:lvl9pPr>
+              <a:defRPr sz="1800"/>
+            </a:lvl9pPr>
+          </a:lstStyle>
+          <a:p>
+            <a:pPr lvl="0"/>
+            <a:r>
+              <a:rPr lang="en-US" smtClean="0"/>
+              <a:t>Click to edit Master text styles</a:t>
+            </a:r>
+          </a:p>
+          <a:p>
+            <a:pPr lvl="1"/>
+            <a:r>
+              <a:rPr lang="en-US" smtClean="0"/>
+              <a:t>Second level</a:t>
+            </a:r>
+          </a:p>
+          <a:p>
+            <a:pPr lvl="2"/>
+            <a:r>
+              <a:rPr lang="en-US" smtClean="0"/>
+              <a:t>Third level</a:t>
+            </a:r>
+          </a:p>
+          <a:p>
+            <a:pPr lvl="3"/>
+            <a:r>
+              <a:rPr lang="en-US" smtClean="0"/>
+              <a:t>Fourth level</a:t>
+            </a:r>
+          </a:p>
+          <a:p>
+            <a:pPr lvl="4"/>
+            <a:r>
+              <a:rPr lang="en-US" smtClean="0"/>
+              <a:t>Fifth level</a:t>
+            </a:r>
+            <a:endParaRPr lang="de-DE" dirty="0"/>
+          </a:p>
+        </p:txBody>
+      </p:sp>
+      <p:sp>
+        <p:nvSpPr>
+          <p:cNvPr id="5" name="Datumsplatzhalter 4"/>
+          <p:cNvSpPr>
+            <a:spLocks noGrp="1"/>
+          </p:cNvSpPr>
+          <p:nvPr>
+            <p:ph type="dt" sz="half" idx="10"/>
+          </p:nvPr>
+        </p:nvSpPr>
+        <p:spPr>
+          <a:xfrm>
+            <a:off x="4238247" y="6434242"/>
+            <a:ext cx="1008112" cy="365125"/>
+          </a:xfrm>
+          <a:prstGeom prst="rect">
+            <a:avLst/>
+          </a:prstGeom>
+        </p:spPr>
+        <p:txBody>
+          <a:bodyPr/>
+          <a:lstStyle/>
+          <a:p>
+            <a:fld id="{C699CB88-5E1A-4FAC-892A-60949ACB1F6F}" type="datetimeFigureOut">
+              <a:rPr lang="en-US" smtClean="0">
+                <a:solidFill>
+                  <a:prstClr val="black">
+                    <a:tint val="75000"/>
+                  </a:prstClr>
+                </a:solidFill>
+              </a:rPr>
+              <a:pPr/>
+              <a:t>17/04/14</a:t>
+            </a:fld>
+            <a:endParaRPr lang="en-US">
+              <a:solidFill>
+                <a:prstClr val="black">
+                  <a:tint val="75000"/>
+                </a:prstClr>
+              </a:solidFill>
+            </a:endParaRPr>
+          </a:p>
+        </p:txBody>
+      </p:sp>
+      <p:sp>
+        <p:nvSpPr>
+          <p:cNvPr id="6" name="Fußzeilenplatzhalter 5"/>
+          <p:cNvSpPr>
+            <a:spLocks noGrp="1"/>
+          </p:cNvSpPr>
+          <p:nvPr>
+            <p:ph type="ftr" sz="quarter" idx="11"/>
+          </p:nvPr>
+        </p:nvSpPr>
+        <p:spPr>
+          <a:xfrm>
+            <a:off x="5318367" y="6434242"/>
+            <a:ext cx="2895600" cy="365125"/>
+          </a:xfrm>
+          <a:prstGeom prst="rect">
+            <a:avLst/>
+          </a:prstGeom>
+        </p:spPr>
+        <p:txBody>
+          <a:bodyPr/>
+          <a:lstStyle/>
+          <a:p>
+            <a:endParaRPr lang="de-DE">
+              <a:solidFill>
+                <a:prstClr val="black">
+                  <a:tint val="75000"/>
+                </a:prstClr>
+              </a:solidFill>
+            </a:endParaRPr>
+          </a:p>
+        </p:txBody>
+      </p:sp>
+      <p:sp>
+        <p:nvSpPr>
+          <p:cNvPr id="7" name="Foliennummernplatzhalter 6"/>
+          <p:cNvSpPr>
+            <a:spLocks noGrp="1"/>
+          </p:cNvSpPr>
+          <p:nvPr>
+            <p:ph type="sldNum" sz="quarter" idx="12"/>
+          </p:nvPr>
+        </p:nvSpPr>
+        <p:spPr>
+          <a:xfrm>
+            <a:off x="8291903" y="6433808"/>
+            <a:ext cx="842170" cy="365125"/>
+          </a:xfrm>
+          <a:prstGeom prst="rect">
+            <a:avLst/>
+          </a:prstGeom>
+        </p:spPr>
+        <p:txBody>
+          <a:bodyPr/>
+          <a:lstStyle/>
+          <a:p>
+            <a:fld id="{91974DF9-AD47-4691-BA21-BBFCE3637A9A}" type="slidenum">
+              <a:rPr lang="en-US" smtClean="0">
+                <a:solidFill>
+                  <a:prstClr val="black">
+                    <a:tint val="75000"/>
+                  </a:prstClr>
+                </a:solidFill>
+              </a:rPr>
+              <a:pPr/>
+              <a:t>‹#›</a:t>
+            </a:fld>
+            <a:endParaRPr lang="en-US">
+              <a:solidFill>
+                <a:prstClr val="black">
+                  <a:tint val="75000"/>
+                </a:prstClr>
+              </a:solidFill>
+            </a:endParaRPr>
+          </a:p>
+        </p:txBody>
+      </p:sp>
+    </p:spTree>
+    <p:extLst>
+      <p:ext uri="{BB962C8B-B14F-4D97-AF65-F5344CB8AC3E}">
+        <p14:creationId xmlns:p14="http://schemas.microsoft.com/office/powerpoint/2010/main" val="2646444322"/>
+      </p:ext>
+    </p:extLst>
+  </p:cSld>
+  <p:clrMapOvr>
+    <a:masterClrMapping/>
+  </p:clrMapOvr>
+  <p:timing>
+    <p:tnLst>
+      <p:par>
+        <p:cTn xmlns:p14="http://schemas.microsoft.com/office/powerpoint/2010/main" id="1" dur="indefinite" restart="never" nodeType="tmRoot"/>
+      </p:par>
+    </p:tnLst>
+  </p:timing>
 </p:sldLayout>
 </file>
 
@@ -3910,7 +4711,7 @@
           <a:p>
             <a:fld id="{DE9D31E7-7064-EF4F-93F0-966D653C7150}" type="datetimeFigureOut">
               <a:rPr lang="en-US" smtClean="0"/>
-              <a:t>4/2/14</a:t>
+              <a:t>17/04/14</a:t>
             </a:fld>
             <a:endParaRPr lang="en-US"/>
           </a:p>
@@ -4198,7 +4999,7 @@
           <a:p>
             <a:fld id="{DE9D31E7-7064-EF4F-93F0-966D653C7150}" type="datetimeFigureOut">
               <a:rPr lang="en-US" smtClean="0"/>
-              <a:t>4/2/14</a:t>
+              <a:t>17/04/14</a:t>
             </a:fld>
             <a:endParaRPr lang="en-US"/>
           </a:p>
@@ -4620,7 +5421,7 @@
           <a:p>
             <a:fld id="{DE9D31E7-7064-EF4F-93F0-966D653C7150}" type="datetimeFigureOut">
               <a:rPr lang="en-US" smtClean="0"/>
-              <a:t>4/2/14</a:t>
+              <a:t>17/04/14</a:t>
             </a:fld>
             <a:endParaRPr lang="en-US"/>
           </a:p>
@@ -4738,7 +5539,7 @@
           <a:p>
             <a:fld id="{DE9D31E7-7064-EF4F-93F0-966D653C7150}" type="datetimeFigureOut">
               <a:rPr lang="en-US" smtClean="0"/>
-              <a:t>4/2/14</a:t>
+              <a:t>17/04/14</a:t>
             </a:fld>
             <a:endParaRPr lang="en-US"/>
           </a:p>
@@ -4833,7 +5634,7 @@
           <a:p>
             <a:fld id="{DE9D31E7-7064-EF4F-93F0-966D653C7150}" type="datetimeFigureOut">
               <a:rPr lang="en-US" smtClean="0"/>
-              <a:t>4/2/14</a:t>
+              <a:t>17/04/14</a:t>
             </a:fld>
             <a:endParaRPr lang="en-US"/>
           </a:p>
@@ -5110,7 +5911,7 @@
           <a:p>
             <a:fld id="{DE9D31E7-7064-EF4F-93F0-966D653C7150}" type="datetimeFigureOut">
               <a:rPr lang="en-US" smtClean="0"/>
-              <a:t>4/2/14</a:t>
+              <a:t>17/04/14</a:t>
             </a:fld>
             <a:endParaRPr lang="en-US"/>
           </a:p>
@@ -5367,7 +6168,7 @@
           <a:p>
             <a:fld id="{DE9D31E7-7064-EF4F-93F0-966D653C7150}" type="datetimeFigureOut">
               <a:rPr lang="en-US" smtClean="0"/>
-              <a:t>4/2/14</a:t>
+              <a:t>17/04/14</a:t>
             </a:fld>
             <a:endParaRPr lang="en-US"/>
           </a:p>
@@ -5580,7 +6381,7 @@
           <a:p>
             <a:fld id="{DE9D31E7-7064-EF4F-93F0-966D653C7150}" type="datetimeFigureOut">
               <a:rPr lang="en-US" smtClean="0"/>
-              <a:t>4/2/14</a:t>
+              <a:t>17/04/14</a:t>
             </a:fld>
             <a:endParaRPr lang="en-US"/>
           </a:p>
@@ -6066,7 +6867,7 @@
                 </a:solidFill>
               </a:rPr>
               <a:pPr defTabSz="914400"/>
-              <a:t>4/3/14</a:t>
+              <a:t>17/04/14</a:t>
             </a:fld>
             <a:endParaRPr lang="en-US" dirty="0">
               <a:solidFill>
@@ -6676,6 +7477,700 @@
 </p:sldMaster>
 </file>
 
+<file path=ppt/slideMasters/slideMaster3.xml><?xml version="1.0" encoding="utf-8"?>
+<p:sldMaster xmlns:a="http://schemas.openxmlformats.org/drawingml/2006/main" xmlns:r="http://schemas.openxmlformats.org/officeDocument/2006/relationships" xmlns:p="http://schemas.openxmlformats.org/presentationml/2006/main">
+  <p:cSld>
+    <p:bg>
+      <p:bgPr>
+        <a:solidFill>
+          <a:schemeClr val="bg1"/>
+        </a:solidFill>
+        <a:effectLst/>
+      </p:bgPr>
+    </p:bg>
+    <p:spTree>
+      <p:nvGrpSpPr>
+        <p:cNvPr id="1" name=""/>
+        <p:cNvGrpSpPr/>
+        <p:nvPr/>
+      </p:nvGrpSpPr>
+      <p:grpSpPr>
+        <a:xfrm>
+          <a:off x="0" y="0"/>
+          <a:ext cx="0" cy="0"/>
+          <a:chOff x="0" y="0"/>
+          <a:chExt cx="0" cy="0"/>
+        </a:xfrm>
+      </p:grpSpPr>
+      <p:sp>
+        <p:nvSpPr>
+          <p:cNvPr id="1026" name="Rectangle 10"/>
+          <p:cNvSpPr>
+            <a:spLocks noGrp="1" noChangeArrowheads="1"/>
+          </p:cNvSpPr>
+          <p:nvPr>
+            <p:ph type="title"/>
+          </p:nvPr>
+        </p:nvSpPr>
+        <p:spPr bwMode="auto">
+          <a:xfrm>
+            <a:off x="611188" y="838200"/>
+            <a:ext cx="8532812" cy="762000"/>
+          </a:xfrm>
+          <a:prstGeom prst="rect">
+            <a:avLst/>
+          </a:prstGeom>
+          <a:noFill/>
+          <a:ln>
+            <a:noFill/>
+          </a:ln>
+          <a:extLst>
+            <a:ext uri="{909E8E84-426E-40dd-AFC4-6F175D3DCCD1}">
+              <a14:hiddenFill xmlns:a14="http://schemas.microsoft.com/office/drawing/2010/main">
+                <a:solidFill>
+                  <a:srgbClr val="FFFFFF"/>
+                </a:solidFill>
+              </a14:hiddenFill>
+            </a:ext>
+            <a:ext uri="{91240B29-F687-4f45-9708-019B960494DF}">
+              <a14:hiddenLine xmlns:a14="http://schemas.microsoft.com/office/drawing/2010/main" w="9525">
+                <a:solidFill>
+                  <a:srgbClr val="000000"/>
+                </a:solidFill>
+                <a:miter lim="800000"/>
+                <a:headEnd/>
+                <a:tailEnd/>
+              </a14:hiddenLine>
+            </a:ext>
+            <a:ext uri="{FAA26D3D-D897-4be2-8F04-BA451C77F1D7}">
+              <ma14:placeholderFlag xmlns:ma14="http://schemas.microsoft.com/office/mac/drawingml/2011/main" val="1"/>
+            </a:ext>
+          </a:extLst>
+        </p:spPr>
+        <p:txBody>
+          <a:bodyPr vert="horz" wrap="square" lIns="91440" tIns="45720" rIns="91440" bIns="45720" numCol="1" anchor="ctr" anchorCtr="0" compatLnSpc="1">
+            <a:prstTxWarp prst="textNoShape">
+              <a:avLst/>
+            </a:prstTxWarp>
+          </a:bodyPr>
+          <a:lstStyle/>
+          <a:p>
+            <a:pPr lvl="0"/>
+            <a:r>
+              <a:rPr lang="en-US" smtClean="0"/>
+              <a:t>Click to edit Master title style</a:t>
+            </a:r>
+            <a:endParaRPr lang="sv-SE" dirty="0"/>
+          </a:p>
+        </p:txBody>
+      </p:sp>
+      <p:sp>
+        <p:nvSpPr>
+          <p:cNvPr id="1027" name="Rectangle 11"/>
+          <p:cNvSpPr>
+            <a:spLocks noGrp="1" noChangeArrowheads="1"/>
+          </p:cNvSpPr>
+          <p:nvPr>
+            <p:ph type="body" idx="1"/>
+          </p:nvPr>
+        </p:nvSpPr>
+        <p:spPr bwMode="auto">
+          <a:xfrm>
+            <a:off x="683568" y="1988840"/>
+            <a:ext cx="7772400" cy="4495800"/>
+          </a:xfrm>
+          <a:prstGeom prst="rect">
+            <a:avLst/>
+          </a:prstGeom>
+          <a:noFill/>
+          <a:ln>
+            <a:noFill/>
+          </a:ln>
+          <a:extLst>
+            <a:ext uri="{909E8E84-426E-40dd-AFC4-6F175D3DCCD1}">
+              <a14:hiddenFill xmlns:a14="http://schemas.microsoft.com/office/drawing/2010/main">
+                <a:solidFill>
+                  <a:srgbClr val="FFFFFF"/>
+                </a:solidFill>
+              </a14:hiddenFill>
+            </a:ext>
+            <a:ext uri="{91240B29-F687-4f45-9708-019B960494DF}">
+              <a14:hiddenLine xmlns:a14="http://schemas.microsoft.com/office/drawing/2010/main" w="9525">
+                <a:solidFill>
+                  <a:srgbClr val="000000"/>
+                </a:solidFill>
+                <a:miter lim="800000"/>
+                <a:headEnd/>
+                <a:tailEnd/>
+              </a14:hiddenLine>
+            </a:ext>
+            <a:ext uri="{FAA26D3D-D897-4be2-8F04-BA451C77F1D7}">
+              <ma14:placeholderFlag xmlns:ma14="http://schemas.microsoft.com/office/mac/drawingml/2011/main" val="1"/>
+            </a:ext>
+          </a:extLst>
+        </p:spPr>
+        <p:txBody>
+          <a:bodyPr vert="horz" wrap="square" lIns="91440" tIns="45720" rIns="91440" bIns="45720" numCol="1" anchor="t" anchorCtr="0" compatLnSpc="1">
+            <a:prstTxWarp prst="textNoShape">
+              <a:avLst/>
+            </a:prstTxWarp>
+          </a:bodyPr>
+          <a:lstStyle/>
+          <a:p>
+            <a:pPr lvl="0"/>
+            <a:r>
+              <a:rPr lang="en-US" smtClean="0"/>
+              <a:t>Click to edit Master text styles</a:t>
+            </a:r>
+          </a:p>
+          <a:p>
+            <a:pPr lvl="1"/>
+            <a:r>
+              <a:rPr lang="en-US" smtClean="0"/>
+              <a:t>Second level</a:t>
+            </a:r>
+          </a:p>
+          <a:p>
+            <a:pPr lvl="2"/>
+            <a:r>
+              <a:rPr lang="en-US" smtClean="0"/>
+              <a:t>Third level</a:t>
+            </a:r>
+          </a:p>
+          <a:p>
+            <a:pPr lvl="3"/>
+            <a:r>
+              <a:rPr lang="en-US" smtClean="0"/>
+              <a:t>Fourth level</a:t>
+            </a:r>
+          </a:p>
+          <a:p>
+            <a:pPr lvl="4"/>
+            <a:r>
+              <a:rPr lang="en-US" smtClean="0"/>
+              <a:t>Fifth level</a:t>
+            </a:r>
+            <a:endParaRPr lang="sv-SE"/>
+          </a:p>
+        </p:txBody>
+      </p:sp>
+      <p:sp>
+        <p:nvSpPr>
+          <p:cNvPr id="1028" name="Rectangle 5"/>
+          <p:cNvSpPr>
+            <a:spLocks noChangeArrowheads="1"/>
+          </p:cNvSpPr>
+          <p:nvPr/>
+        </p:nvSpPr>
+        <p:spPr bwMode="auto">
+          <a:xfrm>
+            <a:off x="0" y="0"/>
+            <a:ext cx="9144000" cy="549275"/>
+          </a:xfrm>
+          <a:prstGeom prst="rect">
+            <a:avLst/>
+          </a:prstGeom>
+          <a:solidFill>
+            <a:schemeClr val="tx1"/>
+          </a:solidFill>
+          <a:ln>
+            <a:noFill/>
+          </a:ln>
+          <a:extLst>
+            <a:ext uri="{91240B29-F687-4f45-9708-019B960494DF}">
+              <a14:hiddenLine xmlns:a14="http://schemas.microsoft.com/office/drawing/2010/main" w="9525">
+                <a:solidFill>
+                  <a:srgbClr val="000000"/>
+                </a:solidFill>
+                <a:round/>
+                <a:headEnd/>
+                <a:tailEnd/>
+              </a14:hiddenLine>
+            </a:ext>
+          </a:extLst>
+        </p:spPr>
+        <p:txBody>
+          <a:bodyPr/>
+          <a:lstStyle/>
+          <a:p>
+            <a:pPr eaLnBrk="0" hangingPunct="0"/>
+            <a:endParaRPr lang="en-US"/>
+          </a:p>
+        </p:txBody>
+      </p:sp>
+      <p:pic>
+        <p:nvPicPr>
+          <p:cNvPr id="6" name="Picture 5" descr="ChalmersU_GU_white.png"/>
+          <p:cNvPicPr>
+            <a:picLocks noChangeAspect="1"/>
+          </p:cNvPicPr>
+          <p:nvPr/>
+        </p:nvPicPr>
+        <p:blipFill>
+          <a:blip r:embed="rId5">
+            <a:extLst>
+              <a:ext uri="{28A0092B-C50C-407E-A947-70E740481C1C}">
+                <a14:useLocalDpi xmlns:a14="http://schemas.microsoft.com/office/drawing/2010/main" val="0"/>
+              </a:ext>
+            </a:extLst>
+          </a:blip>
+          <a:stretch>
+            <a:fillRect/>
+          </a:stretch>
+        </p:blipFill>
+        <p:spPr>
+          <a:xfrm>
+            <a:off x="683568" y="44624"/>
+            <a:ext cx="5400601" cy="468053"/>
+          </a:xfrm>
+          <a:prstGeom prst="rect">
+            <a:avLst/>
+          </a:prstGeom>
+        </p:spPr>
+      </p:pic>
+    </p:spTree>
+  </p:cSld>
+  <p:clrMap bg1="lt1" tx1="dk1" bg2="lt2" tx2="dk2" accent1="accent1" accent2="accent2" accent3="accent3" accent4="accent4" accent5="accent5" accent6="accent6" hlink="hlink" folHlink="folHlink"/>
+  <p:sldLayoutIdLst>
+    <p:sldLayoutId id="2147483684" r:id="rId1"/>
+    <p:sldLayoutId id="2147483685" r:id="rId2"/>
+    <p:sldLayoutId id="2147483686" r:id="rId3"/>
+  </p:sldLayoutIdLst>
+  <p:transition xmlns:p14="http://schemas.microsoft.com/office/powerpoint/2010/main">
+    <p:fade/>
+  </p:transition>
+  <p:timing>
+    <p:tnLst>
+      <p:par>
+        <p:cTn xmlns:p14="http://schemas.microsoft.com/office/powerpoint/2010/main" id="1" dur="indefinite" restart="never" nodeType="tmRoot"/>
+      </p:par>
+    </p:tnLst>
+  </p:timing>
+  <p:txStyles>
+    <p:titleStyle>
+      <a:lvl1pPr algn="l" rtl="0" eaLnBrk="1" fontAlgn="base" hangingPunct="1">
+        <a:spcBef>
+          <a:spcPct val="0"/>
+        </a:spcBef>
+        <a:spcAft>
+          <a:spcPct val="0"/>
+        </a:spcAft>
+        <a:defRPr sz="4000" b="1">
+          <a:solidFill>
+            <a:schemeClr val="tx1"/>
+          </a:solidFill>
+          <a:latin typeface="+mj-lt"/>
+          <a:ea typeface="ＭＳ Ｐゴシック" pitchFamily="96" charset="-128"/>
+          <a:cs typeface="Akzidenz-Bd for Chalmers"/>
+        </a:defRPr>
+      </a:lvl1pPr>
+      <a:lvl2pPr algn="ctr" rtl="0" eaLnBrk="1" fontAlgn="base" hangingPunct="1">
+        <a:spcBef>
+          <a:spcPct val="0"/>
+        </a:spcBef>
+        <a:spcAft>
+          <a:spcPct val="0"/>
+        </a:spcAft>
+        <a:defRPr sz="4000" b="1">
+          <a:solidFill>
+            <a:schemeClr val="tx1"/>
+          </a:solidFill>
+          <a:latin typeface="Arial Black" pitchFamily="68" charset="0"/>
+          <a:ea typeface="ＭＳ Ｐゴシック" pitchFamily="96" charset="-128"/>
+          <a:cs typeface="ＭＳ Ｐゴシック" pitchFamily="96" charset="-128"/>
+        </a:defRPr>
+      </a:lvl2pPr>
+      <a:lvl3pPr algn="ctr" rtl="0" eaLnBrk="1" fontAlgn="base" hangingPunct="1">
+        <a:spcBef>
+          <a:spcPct val="0"/>
+        </a:spcBef>
+        <a:spcAft>
+          <a:spcPct val="0"/>
+        </a:spcAft>
+        <a:defRPr sz="4000" b="1">
+          <a:solidFill>
+            <a:schemeClr val="tx1"/>
+          </a:solidFill>
+          <a:latin typeface="Arial Black" pitchFamily="68" charset="0"/>
+          <a:ea typeface="ＭＳ Ｐゴシック" pitchFamily="96" charset="-128"/>
+          <a:cs typeface="ＭＳ Ｐゴシック" pitchFamily="96" charset="-128"/>
+        </a:defRPr>
+      </a:lvl3pPr>
+      <a:lvl4pPr algn="ctr" rtl="0" eaLnBrk="1" fontAlgn="base" hangingPunct="1">
+        <a:spcBef>
+          <a:spcPct val="0"/>
+        </a:spcBef>
+        <a:spcAft>
+          <a:spcPct val="0"/>
+        </a:spcAft>
+        <a:defRPr sz="4000" b="1">
+          <a:solidFill>
+            <a:schemeClr val="tx1"/>
+          </a:solidFill>
+          <a:latin typeface="Arial Black" pitchFamily="68" charset="0"/>
+          <a:ea typeface="ＭＳ Ｐゴシック" pitchFamily="96" charset="-128"/>
+          <a:cs typeface="ＭＳ Ｐゴシック" pitchFamily="96" charset="-128"/>
+        </a:defRPr>
+      </a:lvl4pPr>
+      <a:lvl5pPr algn="ctr" rtl="0" eaLnBrk="1" fontAlgn="base" hangingPunct="1">
+        <a:spcBef>
+          <a:spcPct val="0"/>
+        </a:spcBef>
+        <a:spcAft>
+          <a:spcPct val="0"/>
+        </a:spcAft>
+        <a:defRPr sz="4000" b="1">
+          <a:solidFill>
+            <a:schemeClr val="tx1"/>
+          </a:solidFill>
+          <a:latin typeface="Arial Black" pitchFamily="68" charset="0"/>
+          <a:ea typeface="ＭＳ Ｐゴシック" pitchFamily="96" charset="-128"/>
+          <a:cs typeface="ＭＳ Ｐゴシック" pitchFamily="96" charset="-128"/>
+        </a:defRPr>
+      </a:lvl5pPr>
+      <a:lvl6pPr marL="457200" algn="ctr" rtl="0" eaLnBrk="1" fontAlgn="base" hangingPunct="1">
+        <a:spcBef>
+          <a:spcPct val="0"/>
+        </a:spcBef>
+        <a:spcAft>
+          <a:spcPct val="0"/>
+        </a:spcAft>
+        <a:defRPr sz="4000">
+          <a:solidFill>
+            <a:schemeClr val="bg1"/>
+          </a:solidFill>
+          <a:latin typeface="Arial Black" pitchFamily="68" charset="0"/>
+        </a:defRPr>
+      </a:lvl6pPr>
+      <a:lvl7pPr marL="914400" algn="ctr" rtl="0" eaLnBrk="1" fontAlgn="base" hangingPunct="1">
+        <a:spcBef>
+          <a:spcPct val="0"/>
+        </a:spcBef>
+        <a:spcAft>
+          <a:spcPct val="0"/>
+        </a:spcAft>
+        <a:defRPr sz="4000">
+          <a:solidFill>
+            <a:schemeClr val="bg1"/>
+          </a:solidFill>
+          <a:latin typeface="Arial Black" pitchFamily="68" charset="0"/>
+        </a:defRPr>
+      </a:lvl7pPr>
+      <a:lvl8pPr marL="1371600" algn="ctr" rtl="0" eaLnBrk="1" fontAlgn="base" hangingPunct="1">
+        <a:spcBef>
+          <a:spcPct val="0"/>
+        </a:spcBef>
+        <a:spcAft>
+          <a:spcPct val="0"/>
+        </a:spcAft>
+        <a:defRPr sz="4000">
+          <a:solidFill>
+            <a:schemeClr val="bg1"/>
+          </a:solidFill>
+          <a:latin typeface="Arial Black" pitchFamily="68" charset="0"/>
+        </a:defRPr>
+      </a:lvl8pPr>
+      <a:lvl9pPr marL="1828800" algn="ctr" rtl="0" eaLnBrk="1" fontAlgn="base" hangingPunct="1">
+        <a:spcBef>
+          <a:spcPct val="0"/>
+        </a:spcBef>
+        <a:spcAft>
+          <a:spcPct val="0"/>
+        </a:spcAft>
+        <a:defRPr sz="4000">
+          <a:solidFill>
+            <a:schemeClr val="bg1"/>
+          </a:solidFill>
+          <a:latin typeface="Arial Black" pitchFamily="68" charset="0"/>
+        </a:defRPr>
+      </a:lvl9pPr>
+    </p:titleStyle>
+    <p:bodyStyle>
+      <a:lvl1pPr marL="342900" indent="-342900" algn="l" rtl="0" eaLnBrk="1" fontAlgn="base" hangingPunct="1">
+        <a:spcBef>
+          <a:spcPct val="20000"/>
+        </a:spcBef>
+        <a:spcAft>
+          <a:spcPct val="0"/>
+        </a:spcAft>
+        <a:buClr>
+          <a:srgbClr val="FF0000"/>
+        </a:buClr>
+        <a:buSzPct val="150000"/>
+        <a:buChar char="•"/>
+        <a:defRPr sz="2000">
+          <a:solidFill>
+            <a:schemeClr val="tx1"/>
+          </a:solidFill>
+          <a:latin typeface="+mn-lt"/>
+          <a:ea typeface="ＭＳ Ｐゴシック" pitchFamily="96" charset="-128"/>
+          <a:cs typeface="Akzidenz for Chalmers Regular"/>
+        </a:defRPr>
+      </a:lvl1pPr>
+      <a:lvl2pPr marL="742950" indent="-285750" algn="l" rtl="0" eaLnBrk="1" fontAlgn="base" hangingPunct="1">
+        <a:spcBef>
+          <a:spcPct val="20000"/>
+        </a:spcBef>
+        <a:spcAft>
+          <a:spcPct val="0"/>
+        </a:spcAft>
+        <a:buClr>
+          <a:srgbClr val="FF0000"/>
+        </a:buClr>
+        <a:buSzPct val="150000"/>
+        <a:buChar char="–"/>
+        <a:defRPr sz="2000">
+          <a:solidFill>
+            <a:schemeClr val="tx1"/>
+          </a:solidFill>
+          <a:latin typeface="+mn-lt"/>
+          <a:ea typeface="ＭＳ Ｐゴシック" pitchFamily="68" charset="-128"/>
+          <a:cs typeface="Akzidenz for Chalmers Regular"/>
+        </a:defRPr>
+      </a:lvl2pPr>
+      <a:lvl3pPr marL="1143000" indent="-228600" algn="l" rtl="0" eaLnBrk="1" fontAlgn="base" hangingPunct="1">
+        <a:spcBef>
+          <a:spcPct val="20000"/>
+        </a:spcBef>
+        <a:spcAft>
+          <a:spcPct val="0"/>
+        </a:spcAft>
+        <a:buClr>
+          <a:srgbClr val="FF0000"/>
+        </a:buClr>
+        <a:buSzPct val="150000"/>
+        <a:buChar char="•"/>
+        <a:defRPr sz="2000">
+          <a:solidFill>
+            <a:schemeClr val="tx1"/>
+          </a:solidFill>
+          <a:latin typeface="+mn-lt"/>
+          <a:ea typeface="ＭＳ Ｐゴシック" pitchFamily="68" charset="-128"/>
+          <a:cs typeface="Akzidenz for Chalmers Regular"/>
+        </a:defRPr>
+      </a:lvl3pPr>
+      <a:lvl4pPr marL="1600200" indent="-228600" algn="l" rtl="0" eaLnBrk="1" fontAlgn="base" hangingPunct="1">
+        <a:spcBef>
+          <a:spcPct val="20000"/>
+        </a:spcBef>
+        <a:spcAft>
+          <a:spcPct val="0"/>
+        </a:spcAft>
+        <a:buClr>
+          <a:srgbClr val="FF0000"/>
+        </a:buClr>
+        <a:buSzPct val="150000"/>
+        <a:buChar char="–"/>
+        <a:defRPr sz="2000">
+          <a:solidFill>
+            <a:schemeClr val="tx1"/>
+          </a:solidFill>
+          <a:latin typeface="+mn-lt"/>
+          <a:ea typeface="ＭＳ Ｐゴシック" pitchFamily="68" charset="-128"/>
+          <a:cs typeface="Akzidenz for Chalmers Regular"/>
+        </a:defRPr>
+      </a:lvl4pPr>
+      <a:lvl5pPr marL="2057400" indent="-228600" algn="l" rtl="0" eaLnBrk="1" fontAlgn="base" hangingPunct="1">
+        <a:spcBef>
+          <a:spcPct val="20000"/>
+        </a:spcBef>
+        <a:spcAft>
+          <a:spcPct val="0"/>
+        </a:spcAft>
+        <a:buClr>
+          <a:srgbClr val="FF0000"/>
+        </a:buClr>
+        <a:buSzPct val="150000"/>
+        <a:buChar char="»"/>
+        <a:defRPr sz="2000">
+          <a:solidFill>
+            <a:schemeClr val="tx1"/>
+          </a:solidFill>
+          <a:latin typeface="+mn-lt"/>
+          <a:ea typeface="ＭＳ Ｐゴシック" pitchFamily="68" charset="-128"/>
+          <a:cs typeface="Akzidenz for Chalmers Regular"/>
+        </a:defRPr>
+      </a:lvl5pPr>
+      <a:lvl6pPr marL="2514600" indent="-228600" algn="l" rtl="0" eaLnBrk="1" fontAlgn="base" hangingPunct="1">
+        <a:spcBef>
+          <a:spcPct val="20000"/>
+        </a:spcBef>
+        <a:spcAft>
+          <a:spcPct val="0"/>
+        </a:spcAft>
+        <a:buClr>
+          <a:srgbClr val="FF0000"/>
+        </a:buClr>
+        <a:buSzPct val="150000"/>
+        <a:buChar char="»"/>
+        <a:defRPr sz="2000">
+          <a:solidFill>
+            <a:schemeClr val="tx1"/>
+          </a:solidFill>
+          <a:latin typeface="+mn-lt"/>
+          <a:ea typeface="ＭＳ Ｐゴシック" pitchFamily="68" charset="-128"/>
+        </a:defRPr>
+      </a:lvl6pPr>
+      <a:lvl7pPr marL="2971800" indent="-228600" algn="l" rtl="0" eaLnBrk="1" fontAlgn="base" hangingPunct="1">
+        <a:spcBef>
+          <a:spcPct val="20000"/>
+        </a:spcBef>
+        <a:spcAft>
+          <a:spcPct val="0"/>
+        </a:spcAft>
+        <a:buClr>
+          <a:srgbClr val="FF0000"/>
+        </a:buClr>
+        <a:buSzPct val="150000"/>
+        <a:buChar char="»"/>
+        <a:defRPr sz="2000">
+          <a:solidFill>
+            <a:schemeClr val="tx1"/>
+          </a:solidFill>
+          <a:latin typeface="+mn-lt"/>
+          <a:ea typeface="ＭＳ Ｐゴシック" pitchFamily="68" charset="-128"/>
+        </a:defRPr>
+      </a:lvl7pPr>
+      <a:lvl8pPr marL="3429000" indent="-228600" algn="l" rtl="0" eaLnBrk="1" fontAlgn="base" hangingPunct="1">
+        <a:spcBef>
+          <a:spcPct val="20000"/>
+        </a:spcBef>
+        <a:spcAft>
+          <a:spcPct val="0"/>
+        </a:spcAft>
+        <a:buClr>
+          <a:srgbClr val="FF0000"/>
+        </a:buClr>
+        <a:buSzPct val="150000"/>
+        <a:buChar char="»"/>
+        <a:defRPr sz="2000">
+          <a:solidFill>
+            <a:schemeClr val="tx1"/>
+          </a:solidFill>
+          <a:latin typeface="+mn-lt"/>
+          <a:ea typeface="ＭＳ Ｐゴシック" pitchFamily="68" charset="-128"/>
+        </a:defRPr>
+      </a:lvl8pPr>
+      <a:lvl9pPr marL="3886200" indent="-228600" algn="l" rtl="0" eaLnBrk="1" fontAlgn="base" hangingPunct="1">
+        <a:spcBef>
+          <a:spcPct val="20000"/>
+        </a:spcBef>
+        <a:spcAft>
+          <a:spcPct val="0"/>
+        </a:spcAft>
+        <a:buClr>
+          <a:srgbClr val="FF0000"/>
+        </a:buClr>
+        <a:buSzPct val="150000"/>
+        <a:buChar char="»"/>
+        <a:defRPr sz="2000">
+          <a:solidFill>
+            <a:schemeClr val="tx1"/>
+          </a:solidFill>
+          <a:latin typeface="+mn-lt"/>
+          <a:ea typeface="ＭＳ Ｐゴシック" pitchFamily="68" charset="-128"/>
+        </a:defRPr>
+      </a:lvl9pPr>
+    </p:bodyStyle>
+    <p:otherStyle>
+      <a:defPPr>
+        <a:defRPr lang="sv-SE"/>
+      </a:defPPr>
+      <a:lvl1pPr marL="0" algn="l" defTabSz="457200" rtl="0" eaLnBrk="1" latinLnBrk="0" hangingPunct="1">
+        <a:defRPr sz="1800" kern="1200">
+          <a:solidFill>
+            <a:schemeClr val="tx1"/>
+          </a:solidFill>
+          <a:latin typeface="+mn-lt"/>
+          <a:ea typeface="+mn-ea"/>
+          <a:cs typeface="+mn-cs"/>
+        </a:defRPr>
+      </a:lvl1pPr>
+      <a:lvl2pPr marL="457200" algn="l" defTabSz="457200" rtl="0" eaLnBrk="1" latinLnBrk="0" hangingPunct="1">
+        <a:defRPr sz="1800" kern="1200">
+          <a:solidFill>
+            <a:schemeClr val="tx1"/>
+          </a:solidFill>
+          <a:latin typeface="+mn-lt"/>
+          <a:ea typeface="+mn-ea"/>
+          <a:cs typeface="+mn-cs"/>
+        </a:defRPr>
+      </a:lvl2pPr>
+      <a:lvl3pPr marL="914400" algn="l" defTabSz="457200" rtl="0" eaLnBrk="1" latinLnBrk="0" hangingPunct="1">
+        <a:defRPr sz="1800" kern="1200">
+          <a:solidFill>
+            <a:schemeClr val="tx1"/>
+          </a:solidFill>
+          <a:latin typeface="+mn-lt"/>
+          <a:ea typeface="+mn-ea"/>
+          <a:cs typeface="+mn-cs"/>
+        </a:defRPr>
+      </a:lvl3pPr>
+      <a:lvl4pPr marL="1371600" algn="l" defTabSz="457200" rtl="0" eaLnBrk="1" latinLnBrk="0" hangingPunct="1">
+        <a:defRPr sz="1800" kern="1200">
+          <a:solidFill>
+            <a:schemeClr val="tx1"/>
+          </a:solidFill>
+          <a:latin typeface="+mn-lt"/>
+          <a:ea typeface="+mn-ea"/>
+          <a:cs typeface="+mn-cs"/>
+        </a:defRPr>
+      </a:lvl4pPr>
+      <a:lvl5pPr marL="1828800" algn="l" defTabSz="457200" rtl="0" eaLnBrk="1" latinLnBrk="0" hangingPunct="1">
+        <a:defRPr sz="1800" kern="1200">
+          <a:solidFill>
+            <a:schemeClr val="tx1"/>
+          </a:solidFill>
+          <a:latin typeface="+mn-lt"/>
+          <a:ea typeface="+mn-ea"/>
+          <a:cs typeface="+mn-cs"/>
+        </a:defRPr>
+      </a:lvl5pPr>
+      <a:lvl6pPr marL="2286000" algn="l" defTabSz="457200" rtl="0" eaLnBrk="1" latinLnBrk="0" hangingPunct="1">
+        <a:defRPr sz="1800" kern="1200">
+          <a:solidFill>
+            <a:schemeClr val="tx1"/>
+          </a:solidFill>
+          <a:latin typeface="+mn-lt"/>
+          <a:ea typeface="+mn-ea"/>
+          <a:cs typeface="+mn-cs"/>
+        </a:defRPr>
+      </a:lvl6pPr>
+      <a:lvl7pPr marL="2743200" algn="l" defTabSz="457200" rtl="0" eaLnBrk="1" latinLnBrk="0" hangingPunct="1">
+        <a:defRPr sz="1800" kern="1200">
+          <a:solidFill>
+            <a:schemeClr val="tx1"/>
+          </a:solidFill>
+          <a:latin typeface="+mn-lt"/>
+          <a:ea typeface="+mn-ea"/>
+          <a:cs typeface="+mn-cs"/>
+        </a:defRPr>
+      </a:lvl7pPr>
+      <a:lvl8pPr marL="3200400" algn="l" defTabSz="457200" rtl="0" eaLnBrk="1" latinLnBrk="0" hangingPunct="1">
+        <a:defRPr sz="1800" kern="1200">
+          <a:solidFill>
+            <a:schemeClr val="tx1"/>
+          </a:solidFill>
+          <a:latin typeface="+mn-lt"/>
+          <a:ea typeface="+mn-ea"/>
+          <a:cs typeface="+mn-cs"/>
+        </a:defRPr>
+      </a:lvl8pPr>
+      <a:lvl9pPr marL="3657600" algn="l" defTabSz="457200" rtl="0" eaLnBrk="1" latinLnBrk="0" hangingPunct="1">
+        <a:defRPr sz="1800" kern="1200">
+          <a:solidFill>
+            <a:schemeClr val="tx1"/>
+          </a:solidFill>
+          <a:latin typeface="+mn-lt"/>
+          <a:ea typeface="+mn-ea"/>
+          <a:cs typeface="+mn-cs"/>
+        </a:defRPr>
+      </a:lvl9pPr>
+    </p:otherStyle>
+  </p:txStyles>
+</p:sldMaster>
+</file>
+
 <file path=ppt/slides/slide1.xml><?xml version="1.0" encoding="utf-8"?>
 <p:sld xmlns:a="http://schemas.openxmlformats.org/drawingml/2006/main" xmlns:r="http://schemas.openxmlformats.org/officeDocument/2006/relationships" xmlns:p="http://schemas.openxmlformats.org/presentationml/2006/main">
   <p:cSld>
@@ -7020,7 +8515,7 @@
         </p:nvGraphicFramePr>
         <p:xfrm>
           <a:off x="4648200" y="1600200"/>
-          <a:ext cx="4038600" cy="3754119"/>
+          <a:ext cx="4038600" cy="4028440"/>
         </p:xfrm>
         <a:graphic>
           <a:graphicData uri="http://schemas.openxmlformats.org/drawingml/2006/table">
@@ -9163,7 +10658,7 @@
         <p:spPr/>
         <p:txBody>
           <a:bodyPr>
-            <a:normAutofit/>
+            <a:normAutofit fontScale="90000"/>
           </a:bodyPr>
           <a:lstStyle/>
           <a:p>
@@ -9509,7 +11004,7 @@
       </p:grpSpPr>
       <p:sp>
         <p:nvSpPr>
-          <p:cNvPr id="2" name="Title 1"/>
+          <p:cNvPr id="6" name="Title 5"/>
           <p:cNvSpPr>
             <a:spLocks noGrp="1"/>
           </p:cNvSpPr>
@@ -9528,12 +11023,31 @@
       </p:sp>
       <p:sp>
         <p:nvSpPr>
-          <p:cNvPr id="3" name="Content Placeholder 2"/>
-          <p:cNvSpPr>
-            <a:spLocks noGrp="1"/>
-          </p:cNvSpPr>
-          <p:nvPr>
-            <p:ph idx="1"/>
+          <p:cNvPr id="7" name="Content Placeholder 6"/>
+          <p:cNvSpPr>
+            <a:spLocks noGrp="1"/>
+          </p:cNvSpPr>
+          <p:nvPr>
+            <p:ph sz="half" idx="1"/>
+          </p:nvPr>
+        </p:nvSpPr>
+        <p:spPr/>
+        <p:txBody>
+          <a:bodyPr/>
+          <a:lstStyle/>
+          <a:p>
+            <a:endParaRPr lang="en-US"/>
+          </a:p>
+        </p:txBody>
+      </p:sp>
+      <p:sp>
+        <p:nvSpPr>
+          <p:cNvPr id="8" name="Content Placeholder 7"/>
+          <p:cNvSpPr>
+            <a:spLocks noGrp="1"/>
+          </p:cNvSpPr>
+          <p:nvPr>
+            <p:ph sz="half" idx="2"/>
           </p:nvPr>
         </p:nvSpPr>
         <p:spPr/>
@@ -9621,7 +11135,7 @@
         <p:spPr/>
         <p:txBody>
           <a:bodyPr>
-            <a:normAutofit fontScale="92500" lnSpcReduction="20000"/>
+            <a:normAutofit fontScale="85000" lnSpcReduction="20000"/>
           </a:bodyPr>
           <a:lstStyle/>
           <a:p>
@@ -11337,7 +12851,7 @@
         <p:spPr/>
         <p:txBody>
           <a:bodyPr>
-            <a:normAutofit fontScale="92500" lnSpcReduction="20000"/>
+            <a:normAutofit fontScale="92500" lnSpcReduction="10000"/>
           </a:bodyPr>
           <a:lstStyle/>
           <a:p>
@@ -11904,7 +13418,7 @@
         </p:blipFill>
         <p:spPr>
           <a:xfrm>
-            <a:off x="0" y="1364232"/>
+            <a:off x="0" y="1935732"/>
             <a:ext cx="9177240" cy="4379283"/>
           </a:xfrm>
         </p:spPr>
@@ -11991,7 +13505,12 @@
             <p:ph sz="half" idx="1"/>
           </p:nvPr>
         </p:nvSpPr>
-        <p:spPr/>
+        <p:spPr>
+          <a:xfrm>
+            <a:off x="457200" y="1917700"/>
+            <a:ext cx="4038600" cy="4525963"/>
+          </a:xfrm>
+        </p:spPr>
         <p:txBody>
           <a:bodyPr>
             <a:normAutofit/>
@@ -12081,7 +13600,12 @@
             <p:ph sz="half" idx="2"/>
           </p:nvPr>
         </p:nvSpPr>
-        <p:spPr/>
+        <p:spPr>
+          <a:xfrm>
+            <a:off x="4648200" y="1917700"/>
+            <a:ext cx="4038600" cy="4525963"/>
+          </a:xfrm>
+        </p:spPr>
         <p:txBody>
           <a:bodyPr>
             <a:normAutofit/>
@@ -13071,6 +14595,845 @@
 </file>
 
 <file path=ppt/theme/theme3.xml><?xml version="1.0" encoding="utf-8"?>
+<a:theme xmlns:a="http://schemas.openxmlformats.org/drawingml/2006/main" name="PPT-mall eng-Chalmers I GU 2014">
+  <a:themeElements>
+    <a:clrScheme name="Blank Presentation 1">
+      <a:dk1>
+        <a:srgbClr val="000000"/>
+      </a:dk1>
+      <a:lt1>
+        <a:srgbClr val="FFFFFF"/>
+      </a:lt1>
+      <a:dk2>
+        <a:srgbClr val="000000"/>
+      </a:dk2>
+      <a:lt2>
+        <a:srgbClr val="808080"/>
+      </a:lt2>
+      <a:accent1>
+        <a:srgbClr val="BBE0E3"/>
+      </a:accent1>
+      <a:accent2>
+        <a:srgbClr val="333399"/>
+      </a:accent2>
+      <a:accent3>
+        <a:srgbClr val="FFFFFF"/>
+      </a:accent3>
+      <a:accent4>
+        <a:srgbClr val="000000"/>
+      </a:accent4>
+      <a:accent5>
+        <a:srgbClr val="DAEDEF"/>
+      </a:accent5>
+      <a:accent6>
+        <a:srgbClr val="2D2D8A"/>
+      </a:accent6>
+      <a:hlink>
+        <a:srgbClr val="009999"/>
+      </a:hlink>
+      <a:folHlink>
+        <a:srgbClr val="99CC00"/>
+      </a:folHlink>
+    </a:clrScheme>
+    <a:fontScheme name="Blank Presentation">
+      <a:majorFont>
+        <a:latin typeface="Arial Black"/>
+        <a:ea typeface=""/>
+        <a:cs typeface=""/>
+      </a:majorFont>
+      <a:minorFont>
+        <a:latin typeface="Arial"/>
+        <a:ea typeface=""/>
+        <a:cs typeface=""/>
+      </a:minorFont>
+    </a:fontScheme>
+    <a:fmtScheme name="Office">
+      <a:fillStyleLst>
+        <a:solidFill>
+          <a:schemeClr val="phClr"/>
+        </a:solidFill>
+        <a:gradFill rotWithShape="1">
+          <a:gsLst>
+            <a:gs pos="0">
+              <a:schemeClr val="phClr">
+                <a:tint val="50000"/>
+                <a:satMod val="300000"/>
+              </a:schemeClr>
+            </a:gs>
+            <a:gs pos="35000">
+              <a:schemeClr val="phClr">
+                <a:tint val="37000"/>
+                <a:satMod val="300000"/>
+              </a:schemeClr>
+            </a:gs>
+            <a:gs pos="100000">
+              <a:schemeClr val="phClr">
+                <a:tint val="15000"/>
+                <a:satMod val="350000"/>
+              </a:schemeClr>
+            </a:gs>
+          </a:gsLst>
+          <a:lin ang="16200000" scaled="1"/>
+        </a:gradFill>
+        <a:gradFill rotWithShape="1">
+          <a:gsLst>
+            <a:gs pos="0">
+              <a:schemeClr val="phClr">
+                <a:tint val="100000"/>
+                <a:shade val="100000"/>
+                <a:satMod val="130000"/>
+              </a:schemeClr>
+            </a:gs>
+            <a:gs pos="100000">
+              <a:schemeClr val="phClr">
+                <a:tint val="50000"/>
+                <a:shade val="100000"/>
+                <a:satMod val="350000"/>
+              </a:schemeClr>
+            </a:gs>
+          </a:gsLst>
+          <a:lin ang="16200000" scaled="0"/>
+        </a:gradFill>
+      </a:fillStyleLst>
+      <a:lnStyleLst>
+        <a:ln w="9525" cap="flat" cmpd="sng" algn="ctr">
+          <a:solidFill>
+            <a:schemeClr val="phClr">
+              <a:shade val="95000"/>
+              <a:satMod val="105000"/>
+            </a:schemeClr>
+          </a:solidFill>
+          <a:prstDash val="solid"/>
+        </a:ln>
+        <a:ln w="25400" cap="flat" cmpd="sng" algn="ctr">
+          <a:solidFill>
+            <a:schemeClr val="phClr"/>
+          </a:solidFill>
+          <a:prstDash val="solid"/>
+        </a:ln>
+        <a:ln w="38100" cap="flat" cmpd="sng" algn="ctr">
+          <a:solidFill>
+            <a:schemeClr val="phClr"/>
+          </a:solidFill>
+          <a:prstDash val="solid"/>
+        </a:ln>
+      </a:lnStyleLst>
+      <a:effectStyleLst>
+        <a:effectStyle>
+          <a:effectLst>
+            <a:outerShdw blurRad="40000" dist="20000" dir="5400000" rotWithShape="0">
+              <a:srgbClr val="000000">
+                <a:alpha val="38000"/>
+              </a:srgbClr>
+            </a:outerShdw>
+          </a:effectLst>
+        </a:effectStyle>
+        <a:effectStyle>
+          <a:effectLst>
+            <a:outerShdw blurRad="40000" dist="23000" dir="5400000" rotWithShape="0">
+              <a:srgbClr val="000000">
+                <a:alpha val="35000"/>
+              </a:srgbClr>
+            </a:outerShdw>
+          </a:effectLst>
+        </a:effectStyle>
+        <a:effectStyle>
+          <a:effectLst>
+            <a:outerShdw blurRad="40000" dist="23000" dir="5400000" rotWithShape="0">
+              <a:srgbClr val="000000">
+                <a:alpha val="35000"/>
+              </a:srgbClr>
+            </a:outerShdw>
+          </a:effectLst>
+          <a:scene3d>
+            <a:camera prst="orthographicFront">
+              <a:rot lat="0" lon="0" rev="0"/>
+            </a:camera>
+            <a:lightRig rig="threePt" dir="t">
+              <a:rot lat="0" lon="0" rev="1200000"/>
+            </a:lightRig>
+          </a:scene3d>
+          <a:sp3d>
+            <a:bevelT w="63500" h="25400"/>
+          </a:sp3d>
+        </a:effectStyle>
+      </a:effectStyleLst>
+      <a:bgFillStyleLst>
+        <a:solidFill>
+          <a:schemeClr val="phClr"/>
+        </a:solidFill>
+        <a:gradFill rotWithShape="1">
+          <a:gsLst>
+            <a:gs pos="0">
+              <a:schemeClr val="phClr">
+                <a:tint val="40000"/>
+                <a:satMod val="350000"/>
+              </a:schemeClr>
+            </a:gs>
+            <a:gs pos="40000">
+              <a:schemeClr val="phClr">
+                <a:tint val="45000"/>
+                <a:shade val="99000"/>
+                <a:satMod val="350000"/>
+              </a:schemeClr>
+            </a:gs>
+            <a:gs pos="100000">
+              <a:schemeClr val="phClr">
+                <a:shade val="20000"/>
+                <a:satMod val="255000"/>
+              </a:schemeClr>
+            </a:gs>
+          </a:gsLst>
+          <a:path path="circle">
+            <a:fillToRect l="50000" t="-80000" r="50000" b="180000"/>
+          </a:path>
+        </a:gradFill>
+        <a:gradFill rotWithShape="1">
+          <a:gsLst>
+            <a:gs pos="0">
+              <a:schemeClr val="phClr">
+                <a:tint val="80000"/>
+                <a:satMod val="300000"/>
+              </a:schemeClr>
+            </a:gs>
+            <a:gs pos="100000">
+              <a:schemeClr val="phClr">
+                <a:shade val="30000"/>
+                <a:satMod val="200000"/>
+              </a:schemeClr>
+            </a:gs>
+          </a:gsLst>
+          <a:path path="circle">
+            <a:fillToRect l="50000" t="50000" r="50000" b="50000"/>
+          </a:path>
+        </a:gradFill>
+      </a:bgFillStyleLst>
+    </a:fmtScheme>
+  </a:themeElements>
+  <a:objectDefaults>
+    <a:spDef>
+      <a:spPr bwMode="auto">
+        <a:xfrm>
+          <a:off x="0" y="0"/>
+          <a:ext cx="1" cy="1"/>
+        </a:xfrm>
+        <a:custGeom>
+          <a:avLst/>
+          <a:gdLst/>
+          <a:ahLst/>
+          <a:cxnLst/>
+          <a:rect l="0" t="0" r="0" b="0"/>
+          <a:pathLst/>
+        </a:custGeom>
+        <a:solidFill>
+          <a:schemeClr val="accent1"/>
+        </a:solidFill>
+        <a:ln w="9525" cap="flat" cmpd="sng" algn="ctr">
+          <a:solidFill>
+            <a:schemeClr val="tx1"/>
+          </a:solidFill>
+          <a:prstDash val="solid"/>
+          <a:round/>
+          <a:headEnd type="none" w="med" len="med"/>
+          <a:tailEnd type="none" w="med" len="med"/>
+        </a:ln>
+        <a:effectLst/>
+      </a:spPr>
+      <a:bodyPr vert="horz" wrap="square" lIns="91440" tIns="45720" rIns="91440" bIns="45720" numCol="1" anchor="t" anchorCtr="0" compatLnSpc="1">
+        <a:prstTxWarp prst="textNoShape">
+          <a:avLst/>
+        </a:prstTxWarp>
+      </a:bodyPr>
+      <a:lstStyle>
+        <a:defPPr marL="0" marR="0" indent="0" algn="l" defTabSz="914400" rtl="0" eaLnBrk="0" fontAlgn="base" latinLnBrk="0" hangingPunct="0">
+          <a:lnSpc>
+            <a:spcPct val="100000"/>
+          </a:lnSpc>
+          <a:spcBef>
+            <a:spcPct val="0"/>
+          </a:spcBef>
+          <a:spcAft>
+            <a:spcPct val="0"/>
+          </a:spcAft>
+          <a:buClrTx/>
+          <a:buSzTx/>
+          <a:buFontTx/>
+          <a:buNone/>
+          <a:tabLst/>
+          <a:defRPr kumimoji="0" lang="sv-SE" sz="2400" b="0" i="0" u="none" strike="noStrike" cap="none" normalizeH="0" baseline="0">
+            <a:ln>
+              <a:noFill/>
+            </a:ln>
+            <a:solidFill>
+              <a:schemeClr val="tx1"/>
+            </a:solidFill>
+            <a:effectLst/>
+            <a:latin typeface="Times" pitchFamily="68" charset="0"/>
+          </a:defRPr>
+        </a:defPPr>
+      </a:lstStyle>
+    </a:spDef>
+    <a:lnDef>
+      <a:spPr bwMode="auto">
+        <a:xfrm>
+          <a:off x="0" y="0"/>
+          <a:ext cx="1" cy="1"/>
+        </a:xfrm>
+        <a:custGeom>
+          <a:avLst/>
+          <a:gdLst/>
+          <a:ahLst/>
+          <a:cxnLst/>
+          <a:rect l="0" t="0" r="0" b="0"/>
+          <a:pathLst/>
+        </a:custGeom>
+        <a:solidFill>
+          <a:schemeClr val="accent1"/>
+        </a:solidFill>
+        <a:ln w="9525" cap="flat" cmpd="sng" algn="ctr">
+          <a:solidFill>
+            <a:schemeClr val="tx1"/>
+          </a:solidFill>
+          <a:prstDash val="solid"/>
+          <a:round/>
+          <a:headEnd type="none" w="med" len="med"/>
+          <a:tailEnd type="none" w="med" len="med"/>
+        </a:ln>
+        <a:effectLst/>
+      </a:spPr>
+      <a:bodyPr vert="horz" wrap="square" lIns="91440" tIns="45720" rIns="91440" bIns="45720" numCol="1" anchor="t" anchorCtr="0" compatLnSpc="1">
+        <a:prstTxWarp prst="textNoShape">
+          <a:avLst/>
+        </a:prstTxWarp>
+      </a:bodyPr>
+      <a:lstStyle>
+        <a:defPPr marL="0" marR="0" indent="0" algn="l" defTabSz="914400" rtl="0" eaLnBrk="0" fontAlgn="base" latinLnBrk="0" hangingPunct="0">
+          <a:lnSpc>
+            <a:spcPct val="100000"/>
+          </a:lnSpc>
+          <a:spcBef>
+            <a:spcPct val="0"/>
+          </a:spcBef>
+          <a:spcAft>
+            <a:spcPct val="0"/>
+          </a:spcAft>
+          <a:buClrTx/>
+          <a:buSzTx/>
+          <a:buFontTx/>
+          <a:buNone/>
+          <a:tabLst/>
+          <a:defRPr kumimoji="0" lang="sv-SE" sz="2400" b="0" i="0" u="none" strike="noStrike" cap="none" normalizeH="0" baseline="0">
+            <a:ln>
+              <a:noFill/>
+            </a:ln>
+            <a:solidFill>
+              <a:schemeClr val="tx1"/>
+            </a:solidFill>
+            <a:effectLst/>
+            <a:latin typeface="Times" pitchFamily="68" charset="0"/>
+          </a:defRPr>
+        </a:defPPr>
+      </a:lstStyle>
+    </a:lnDef>
+  </a:objectDefaults>
+  <a:extraClrSchemeLst>
+    <a:extraClrScheme>
+      <a:clrScheme name="Blank Presentation 1">
+        <a:dk1>
+          <a:srgbClr val="000000"/>
+        </a:dk1>
+        <a:lt1>
+          <a:srgbClr val="FFFFFF"/>
+        </a:lt1>
+        <a:dk2>
+          <a:srgbClr val="000000"/>
+        </a:dk2>
+        <a:lt2>
+          <a:srgbClr val="808080"/>
+        </a:lt2>
+        <a:accent1>
+          <a:srgbClr val="BBE0E3"/>
+        </a:accent1>
+        <a:accent2>
+          <a:srgbClr val="333399"/>
+        </a:accent2>
+        <a:accent3>
+          <a:srgbClr val="FFFFFF"/>
+        </a:accent3>
+        <a:accent4>
+          <a:srgbClr val="000000"/>
+        </a:accent4>
+        <a:accent5>
+          <a:srgbClr val="DAEDEF"/>
+        </a:accent5>
+        <a:accent6>
+          <a:srgbClr val="2D2D8A"/>
+        </a:accent6>
+        <a:hlink>
+          <a:srgbClr val="009999"/>
+        </a:hlink>
+        <a:folHlink>
+          <a:srgbClr val="99CC00"/>
+        </a:folHlink>
+      </a:clrScheme>
+      <a:clrMap bg1="lt1" tx1="dk1" bg2="lt2" tx2="dk2" accent1="accent1" accent2="accent2" accent3="accent3" accent4="accent4" accent5="accent5" accent6="accent6" hlink="hlink" folHlink="folHlink"/>
+    </a:extraClrScheme>
+    <a:extraClrScheme>
+      <a:clrScheme name="Blank Presentation 2">
+        <a:dk1>
+          <a:srgbClr val="000000"/>
+        </a:dk1>
+        <a:lt1>
+          <a:srgbClr val="FFFFFF"/>
+        </a:lt1>
+        <a:dk2>
+          <a:srgbClr val="000000"/>
+        </a:dk2>
+        <a:lt2>
+          <a:srgbClr val="969696"/>
+        </a:lt2>
+        <a:accent1>
+          <a:srgbClr val="FBDF53"/>
+        </a:accent1>
+        <a:accent2>
+          <a:srgbClr val="FF9966"/>
+        </a:accent2>
+        <a:accent3>
+          <a:srgbClr val="FFFFFF"/>
+        </a:accent3>
+        <a:accent4>
+          <a:srgbClr val="000000"/>
+        </a:accent4>
+        <a:accent5>
+          <a:srgbClr val="FDECB3"/>
+        </a:accent5>
+        <a:accent6>
+          <a:srgbClr val="E78A5C"/>
+        </a:accent6>
+        <a:hlink>
+          <a:srgbClr val="CC3300"/>
+        </a:hlink>
+        <a:folHlink>
+          <a:srgbClr val="996600"/>
+        </a:folHlink>
+      </a:clrScheme>
+      <a:clrMap bg1="lt1" tx1="dk1" bg2="lt2" tx2="dk2" accent1="accent1" accent2="accent2" accent3="accent3" accent4="accent4" accent5="accent5" accent6="accent6" hlink="hlink" folHlink="folHlink"/>
+    </a:extraClrScheme>
+    <a:extraClrScheme>
+      <a:clrScheme name="Blank Presentation 3">
+        <a:dk1>
+          <a:srgbClr val="000000"/>
+        </a:dk1>
+        <a:lt1>
+          <a:srgbClr val="FFFFFF"/>
+        </a:lt1>
+        <a:dk2>
+          <a:srgbClr val="000000"/>
+        </a:dk2>
+        <a:lt2>
+          <a:srgbClr val="808080"/>
+        </a:lt2>
+        <a:accent1>
+          <a:srgbClr val="99CCFF"/>
+        </a:accent1>
+        <a:accent2>
+          <a:srgbClr val="CCCCFF"/>
+        </a:accent2>
+        <a:accent3>
+          <a:srgbClr val="FFFFFF"/>
+        </a:accent3>
+        <a:accent4>
+          <a:srgbClr val="000000"/>
+        </a:accent4>
+        <a:accent5>
+          <a:srgbClr val="CAE2FF"/>
+        </a:accent5>
+        <a:accent6>
+          <a:srgbClr val="B9B9E7"/>
+        </a:accent6>
+        <a:hlink>
+          <a:srgbClr val="3333CC"/>
+        </a:hlink>
+        <a:folHlink>
+          <a:srgbClr val="AF67FF"/>
+        </a:folHlink>
+      </a:clrScheme>
+      <a:clrMap bg1="lt1" tx1="dk1" bg2="lt2" tx2="dk2" accent1="accent1" accent2="accent2" accent3="accent3" accent4="accent4" accent5="accent5" accent6="accent6" hlink="hlink" folHlink="folHlink"/>
+    </a:extraClrScheme>
+    <a:extraClrScheme>
+      <a:clrScheme name="Blank Presentation 4">
+        <a:dk1>
+          <a:srgbClr val="000000"/>
+        </a:dk1>
+        <a:lt1>
+          <a:srgbClr val="DEF6F1"/>
+        </a:lt1>
+        <a:dk2>
+          <a:srgbClr val="000000"/>
+        </a:dk2>
+        <a:lt2>
+          <a:srgbClr val="969696"/>
+        </a:lt2>
+        <a:accent1>
+          <a:srgbClr val="FFFFFF"/>
+        </a:accent1>
+        <a:accent2>
+          <a:srgbClr val="8DC6FF"/>
+        </a:accent2>
+        <a:accent3>
+          <a:srgbClr val="ECFAF7"/>
+        </a:accent3>
+        <a:accent4>
+          <a:srgbClr val="000000"/>
+        </a:accent4>
+        <a:accent5>
+          <a:srgbClr val="FFFFFF"/>
+        </a:accent5>
+        <a:accent6>
+          <a:srgbClr val="7FB3E7"/>
+        </a:accent6>
+        <a:hlink>
+          <a:srgbClr val="0066CC"/>
+        </a:hlink>
+        <a:folHlink>
+          <a:srgbClr val="00A800"/>
+        </a:folHlink>
+      </a:clrScheme>
+      <a:clrMap bg1="lt1" tx1="dk1" bg2="lt2" tx2="dk2" accent1="accent1" accent2="accent2" accent3="accent3" accent4="accent4" accent5="accent5" accent6="accent6" hlink="hlink" folHlink="folHlink"/>
+    </a:extraClrScheme>
+    <a:extraClrScheme>
+      <a:clrScheme name="Blank Presentation 5">
+        <a:dk1>
+          <a:srgbClr val="000000"/>
+        </a:dk1>
+        <a:lt1>
+          <a:srgbClr val="FFFFD9"/>
+        </a:lt1>
+        <a:dk2>
+          <a:srgbClr val="000000"/>
+        </a:dk2>
+        <a:lt2>
+          <a:srgbClr val="777777"/>
+        </a:lt2>
+        <a:accent1>
+          <a:srgbClr val="FFFFF7"/>
+        </a:accent1>
+        <a:accent2>
+          <a:srgbClr val="33CCCC"/>
+        </a:accent2>
+        <a:accent3>
+          <a:srgbClr val="FFFFE9"/>
+        </a:accent3>
+        <a:accent4>
+          <a:srgbClr val="000000"/>
+        </a:accent4>
+        <a:accent5>
+          <a:srgbClr val="FFFFFA"/>
+        </a:accent5>
+        <a:accent6>
+          <a:srgbClr val="2DB9B9"/>
+        </a:accent6>
+        <a:hlink>
+          <a:srgbClr val="FF5050"/>
+        </a:hlink>
+        <a:folHlink>
+          <a:srgbClr val="FF9900"/>
+        </a:folHlink>
+      </a:clrScheme>
+      <a:clrMap bg1="lt1" tx1="dk1" bg2="lt2" tx2="dk2" accent1="accent1" accent2="accent2" accent3="accent3" accent4="accent4" accent5="accent5" accent6="accent6" hlink="hlink" folHlink="folHlink"/>
+    </a:extraClrScheme>
+    <a:extraClrScheme>
+      <a:clrScheme name="Blank Presentation 6">
+        <a:dk1>
+          <a:srgbClr val="005A58"/>
+        </a:dk1>
+        <a:lt1>
+          <a:srgbClr val="FFFFFF"/>
+        </a:lt1>
+        <a:dk2>
+          <a:srgbClr val="008080"/>
+        </a:dk2>
+        <a:lt2>
+          <a:srgbClr val="FFFF99"/>
+        </a:lt2>
+        <a:accent1>
+          <a:srgbClr val="006462"/>
+        </a:accent1>
+        <a:accent2>
+          <a:srgbClr val="6D6FC7"/>
+        </a:accent2>
+        <a:accent3>
+          <a:srgbClr val="AAC0C0"/>
+        </a:accent3>
+        <a:accent4>
+          <a:srgbClr val="DADADA"/>
+        </a:accent4>
+        <a:accent5>
+          <a:srgbClr val="AAB8B7"/>
+        </a:accent5>
+        <a:accent6>
+          <a:srgbClr val="6264B4"/>
+        </a:accent6>
+        <a:hlink>
+          <a:srgbClr val="00FFFF"/>
+        </a:hlink>
+        <a:folHlink>
+          <a:srgbClr val="00FF00"/>
+        </a:folHlink>
+      </a:clrScheme>
+      <a:clrMap bg1="dk2" tx1="lt1" bg2="dk1" tx2="lt2" accent1="accent1" accent2="accent2" accent3="accent3" accent4="accent4" accent5="accent5" accent6="accent6" hlink="hlink" folHlink="folHlink"/>
+    </a:extraClrScheme>
+    <a:extraClrScheme>
+      <a:clrScheme name="Blank Presentation 7">
+        <a:dk1>
+          <a:srgbClr val="5C1F00"/>
+        </a:dk1>
+        <a:lt1>
+          <a:srgbClr val="FFFFFF"/>
+        </a:lt1>
+        <a:dk2>
+          <a:srgbClr val="800000"/>
+        </a:dk2>
+        <a:lt2>
+          <a:srgbClr val="DFD293"/>
+        </a:lt2>
+        <a:accent1>
+          <a:srgbClr val="713E39"/>
+        </a:accent1>
+        <a:accent2>
+          <a:srgbClr val="BE7960"/>
+        </a:accent2>
+        <a:accent3>
+          <a:srgbClr val="C0AAAA"/>
+        </a:accent3>
+        <a:accent4>
+          <a:srgbClr val="DADADA"/>
+        </a:accent4>
+        <a:accent5>
+          <a:srgbClr val="BBAFAE"/>
+        </a:accent5>
+        <a:accent6>
+          <a:srgbClr val="AC6D56"/>
+        </a:accent6>
+        <a:hlink>
+          <a:srgbClr val="FFFF99"/>
+        </a:hlink>
+        <a:folHlink>
+          <a:srgbClr val="D3A219"/>
+        </a:folHlink>
+      </a:clrScheme>
+      <a:clrMap bg1="dk2" tx1="lt1" bg2="dk1" tx2="lt2" accent1="accent1" accent2="accent2" accent3="accent3" accent4="accent4" accent5="accent5" accent6="accent6" hlink="hlink" folHlink="folHlink"/>
+    </a:extraClrScheme>
+    <a:extraClrScheme>
+      <a:clrScheme name="Blank Presentation 8">
+        <a:dk1>
+          <a:srgbClr val="003366"/>
+        </a:dk1>
+        <a:lt1>
+          <a:srgbClr val="FFFFFF"/>
+        </a:lt1>
+        <a:dk2>
+          <a:srgbClr val="000099"/>
+        </a:dk2>
+        <a:lt2>
+          <a:srgbClr val="CCFFFF"/>
+        </a:lt2>
+        <a:accent1>
+          <a:srgbClr val="3366CC"/>
+        </a:accent1>
+        <a:accent2>
+          <a:srgbClr val="00B000"/>
+        </a:accent2>
+        <a:accent3>
+          <a:srgbClr val="AAAACA"/>
+        </a:accent3>
+        <a:accent4>
+          <a:srgbClr val="DADADA"/>
+        </a:accent4>
+        <a:accent5>
+          <a:srgbClr val="ADB8E2"/>
+        </a:accent5>
+        <a:accent6>
+          <a:srgbClr val="009F00"/>
+        </a:accent6>
+        <a:hlink>
+          <a:srgbClr val="66CCFF"/>
+        </a:hlink>
+        <a:folHlink>
+          <a:srgbClr val="FFE701"/>
+        </a:folHlink>
+      </a:clrScheme>
+      <a:clrMap bg1="dk2" tx1="lt1" bg2="dk1" tx2="lt2" accent1="accent1" accent2="accent2" accent3="accent3" accent4="accent4" accent5="accent5" accent6="accent6" hlink="hlink" folHlink="folHlink"/>
+    </a:extraClrScheme>
+    <a:extraClrScheme>
+      <a:clrScheme name="Blank Presentation 9">
+        <a:dk1>
+          <a:srgbClr val="336699"/>
+        </a:dk1>
+        <a:lt1>
+          <a:srgbClr val="FFFFFF"/>
+        </a:lt1>
+        <a:dk2>
+          <a:srgbClr val="000000"/>
+        </a:dk2>
+        <a:lt2>
+          <a:srgbClr val="E3EBF1"/>
+        </a:lt2>
+        <a:accent1>
+          <a:srgbClr val="003399"/>
+        </a:accent1>
+        <a:accent2>
+          <a:srgbClr val="468A4B"/>
+        </a:accent2>
+        <a:accent3>
+          <a:srgbClr val="AAAAAA"/>
+        </a:accent3>
+        <a:accent4>
+          <a:srgbClr val="DADADA"/>
+        </a:accent4>
+        <a:accent5>
+          <a:srgbClr val="AAADCA"/>
+        </a:accent5>
+        <a:accent6>
+          <a:srgbClr val="3F7D43"/>
+        </a:accent6>
+        <a:hlink>
+          <a:srgbClr val="66CCFF"/>
+        </a:hlink>
+        <a:folHlink>
+          <a:srgbClr val="F0E500"/>
+        </a:folHlink>
+      </a:clrScheme>
+      <a:clrMap bg1="dk2" tx1="lt1" bg2="dk1" tx2="lt2" accent1="accent1" accent2="accent2" accent3="accent3" accent4="accent4" accent5="accent5" accent6="accent6" hlink="hlink" folHlink="folHlink"/>
+    </a:extraClrScheme>
+    <a:extraClrScheme>
+      <a:clrScheme name="Blank Presentation 10">
+        <a:dk1>
+          <a:srgbClr val="777777"/>
+        </a:dk1>
+        <a:lt1>
+          <a:srgbClr val="FFFFFF"/>
+        </a:lt1>
+        <a:dk2>
+          <a:srgbClr val="686B5D"/>
+        </a:dk2>
+        <a:lt2>
+          <a:srgbClr val="D1D1CB"/>
+        </a:lt2>
+        <a:accent1>
+          <a:srgbClr val="909082"/>
+        </a:accent1>
+        <a:accent2>
+          <a:srgbClr val="809EA8"/>
+        </a:accent2>
+        <a:accent3>
+          <a:srgbClr val="B9BAB6"/>
+        </a:accent3>
+        <a:accent4>
+          <a:srgbClr val="DADADA"/>
+        </a:accent4>
+        <a:accent5>
+          <a:srgbClr val="C6C6C1"/>
+        </a:accent5>
+        <a:accent6>
+          <a:srgbClr val="738F98"/>
+        </a:accent6>
+        <a:hlink>
+          <a:srgbClr val="FFCC66"/>
+        </a:hlink>
+        <a:folHlink>
+          <a:srgbClr val="E9DCB9"/>
+        </a:folHlink>
+      </a:clrScheme>
+      <a:clrMap bg1="dk2" tx1="lt1" bg2="dk1" tx2="lt2" accent1="accent1" accent2="accent2" accent3="accent3" accent4="accent4" accent5="accent5" accent6="accent6" hlink="hlink" folHlink="folHlink"/>
+    </a:extraClrScheme>
+    <a:extraClrScheme>
+      <a:clrScheme name="Blank Presentation 11">
+        <a:dk1>
+          <a:srgbClr val="3E3E5C"/>
+        </a:dk1>
+        <a:lt1>
+          <a:srgbClr val="FFFFFF"/>
+        </a:lt1>
+        <a:dk2>
+          <a:srgbClr val="666699"/>
+        </a:dk2>
+        <a:lt2>
+          <a:srgbClr val="FFFFFF"/>
+        </a:lt2>
+        <a:accent1>
+          <a:srgbClr val="60597B"/>
+        </a:accent1>
+        <a:accent2>
+          <a:srgbClr val="6666FF"/>
+        </a:accent2>
+        <a:accent3>
+          <a:srgbClr val="B8B8CA"/>
+        </a:accent3>
+        <a:accent4>
+          <a:srgbClr val="DADADA"/>
+        </a:accent4>
+        <a:accent5>
+          <a:srgbClr val="B6B5BF"/>
+        </a:accent5>
+        <a:accent6>
+          <a:srgbClr val="5C5CE7"/>
+        </a:accent6>
+        <a:hlink>
+          <a:srgbClr val="99CCFF"/>
+        </a:hlink>
+        <a:folHlink>
+          <a:srgbClr val="FFFF99"/>
+        </a:folHlink>
+      </a:clrScheme>
+      <a:clrMap bg1="dk2" tx1="lt1" bg2="dk1" tx2="lt2" accent1="accent1" accent2="accent2" accent3="accent3" accent4="accent4" accent5="accent5" accent6="accent6" hlink="hlink" folHlink="folHlink"/>
+    </a:extraClrScheme>
+    <a:extraClrScheme>
+      <a:clrScheme name="Blank Presentation 12">
+        <a:dk1>
+          <a:srgbClr val="2D2015"/>
+        </a:dk1>
+        <a:lt1>
+          <a:srgbClr val="FFFFFF"/>
+        </a:lt1>
+        <a:dk2>
+          <a:srgbClr val="523E26"/>
+        </a:dk2>
+        <a:lt2>
+          <a:srgbClr val="DFC08D"/>
+        </a:lt2>
+        <a:accent1>
+          <a:srgbClr val="8C7B70"/>
+        </a:accent1>
+        <a:accent2>
+          <a:srgbClr val="8F5F2F"/>
+        </a:accent2>
+        <a:accent3>
+          <a:srgbClr val="B3AFAC"/>
+        </a:accent3>
+        <a:accent4>
+          <a:srgbClr val="DADADA"/>
+        </a:accent4>
+        <a:accent5>
+          <a:srgbClr val="C5BFBB"/>
+        </a:accent5>
+        <a:accent6>
+          <a:srgbClr val="81552A"/>
+        </a:accent6>
+        <a:hlink>
+          <a:srgbClr val="CCB400"/>
+        </a:hlink>
+        <a:folHlink>
+          <a:srgbClr val="8C9EA0"/>
+        </a:folHlink>
+      </a:clrScheme>
+      <a:clrMap bg1="dk2" tx1="lt1" bg2="dk1" tx2="lt2" accent1="accent1" accent2="accent2" accent3="accent3" accent4="accent4" accent5="accent5" accent6="accent6" hlink="hlink" folHlink="folHlink"/>
+    </a:extraClrScheme>
+  </a:extraClrSchemeLst>
+</a:theme>
+</file>
+
+<file path=ppt/theme/theme4.xml><?xml version="1.0" encoding="utf-8"?>
 <a:theme xmlns:a="http://schemas.openxmlformats.org/drawingml/2006/main" name="Office Theme">
   <a:themeElements>
     <a:clrScheme name="Office">

</xml_diff>